<commit_message>
Recihwald wird mit d geschrieben und nicht mit t. Einmal kurz in die Mails schauen hätte gereicht!
</commit_message>
<xml_diff>
--- a/Documentation/Projektpräsentationabschluss.pptx
+++ b/Documentation/Projektpräsentationabschluss.pptx
@@ -122,7 +122,7 @@
   </p:defaultTextStyle>
   <p:extLst>
     <p:ext uri="{EFAFB233-063F-42B5-8137-9DF3F51BA10A}">
-      <p15:sldGuideLst xmlns:p15="http://schemas.microsoft.com/office/powerpoint/2012/main"/>
+      <p15:sldGuideLst xmlns:p15="http://schemas.microsoft.com/office/powerpoint/2012/main" xmlns=""/>
     </p:ext>
   </p:extLst>
 </p:presentation>
@@ -210,6 +210,7 @@
           <a:p>
             <a:fld id="{4E45D809-3636-488F-AD07-024138342201}" type="datetimeFigureOut">
               <a:rPr lang="de-DE" smtClean="0"/>
+              <a:pPr/>
               <a:t>14.11.2016</a:t>
             </a:fld>
             <a:endParaRPr lang="de-DE"/>
@@ -369,7 +370,8 @@
           <a:p>
             <a:fld id="{3707EE4E-8712-4F08-AF1D-74F42BF5D300}" type="slidenum">
               <a:rPr lang="de-DE" smtClean="0"/>
-              <a:t>‹#›</a:t>
+              <a:pPr/>
+              <a:t>‹Nr.›</a:t>
             </a:fld>
             <a:endParaRPr lang="de-DE"/>
           </a:p>
@@ -378,7 +380,7 @@
     </p:spTree>
     <p:extLst>
       <p:ext uri="{BB962C8B-B14F-4D97-AF65-F5344CB8AC3E}">
-        <p14:creationId xmlns:p14="http://schemas.microsoft.com/office/powerpoint/2010/main" val="1230638808"/>
+        <p14:creationId xmlns:p14="http://schemas.microsoft.com/office/powerpoint/2010/main" xmlns="" val="1230638808"/>
       </p:ext>
     </p:extLst>
   </p:cSld>
@@ -543,6 +545,7 @@
           <a:p>
             <a:fld id="{3707EE4E-8712-4F08-AF1D-74F42BF5D300}" type="slidenum">
               <a:rPr lang="de-DE" smtClean="0"/>
+              <a:pPr/>
               <a:t>2</a:t>
             </a:fld>
             <a:endParaRPr lang="de-DE"/>
@@ -552,7 +555,7 @@
     </p:spTree>
     <p:extLst>
       <p:ext uri="{BB962C8B-B14F-4D97-AF65-F5344CB8AC3E}">
-        <p14:creationId xmlns:p14="http://schemas.microsoft.com/office/powerpoint/2010/main" val="1167283433"/>
+        <p14:creationId xmlns:p14="http://schemas.microsoft.com/office/powerpoint/2010/main" xmlns="" val="1167283433"/>
       </p:ext>
     </p:extLst>
   </p:cSld>
@@ -1064,6 +1067,7 @@
           <a:p>
             <a:fld id="{000C1418-253B-41CF-856F-93E37DD34B9E}" type="datetime1">
               <a:rPr lang="de-DE" smtClean="0"/>
+              <a:pPr/>
               <a:t>14.11.2016</a:t>
             </a:fld>
             <a:endParaRPr lang="de-DE"/>
@@ -1111,7 +1115,8 @@
           <a:p>
             <a:fld id="{5E680A4B-04F8-4611-9407-6DB017F4B4FB}" type="slidenum">
               <a:rPr lang="de-DE" smtClean="0"/>
-              <a:t>‹#›</a:t>
+              <a:pPr/>
+              <a:t>‹Nr.›</a:t>
             </a:fld>
             <a:endParaRPr lang="de-DE"/>
           </a:p>
@@ -1120,7 +1125,7 @@
     </p:spTree>
     <p:extLst>
       <p:ext uri="{BB962C8B-B14F-4D97-AF65-F5344CB8AC3E}">
-        <p14:creationId xmlns:p14="http://schemas.microsoft.com/office/powerpoint/2010/main" val="919903332"/>
+        <p14:creationId xmlns:p14="http://schemas.microsoft.com/office/powerpoint/2010/main" xmlns="" val="919903332"/>
       </p:ext>
     </p:extLst>
   </p:cSld>
@@ -1360,6 +1365,7 @@
           <a:p>
             <a:fld id="{DB7D521E-8BB3-4B5F-B4B1-F6EF7EB153E4}" type="datetime1">
               <a:rPr lang="de-DE" smtClean="0"/>
+              <a:pPr/>
               <a:t>14.11.2016</a:t>
             </a:fld>
             <a:endParaRPr lang="de-DE"/>
@@ -1402,7 +1408,8 @@
           <a:p>
             <a:fld id="{5E680A4B-04F8-4611-9407-6DB017F4B4FB}" type="slidenum">
               <a:rPr lang="de-DE" smtClean="0"/>
-              <a:t>‹#›</a:t>
+              <a:pPr/>
+              <a:t>‹Nr.›</a:t>
             </a:fld>
             <a:endParaRPr lang="de-DE"/>
           </a:p>
@@ -1411,7 +1418,7 @@
     </p:spTree>
     <p:extLst>
       <p:ext uri="{BB962C8B-B14F-4D97-AF65-F5344CB8AC3E}">
-        <p14:creationId xmlns:p14="http://schemas.microsoft.com/office/powerpoint/2010/main" val="397873913"/>
+        <p14:creationId xmlns:p14="http://schemas.microsoft.com/office/powerpoint/2010/main" xmlns="" val="397873913"/>
       </p:ext>
     </p:extLst>
   </p:cSld>
@@ -1608,6 +1615,7 @@
           <a:p>
             <a:fld id="{C6C7787D-DBE4-4E04-9844-9ACD8A3D67BE}" type="datetime1">
               <a:rPr lang="de-DE" smtClean="0"/>
+              <a:pPr/>
               <a:t>14.11.2016</a:t>
             </a:fld>
             <a:endParaRPr lang="de-DE"/>
@@ -1650,7 +1658,8 @@
           <a:p>
             <a:fld id="{5E680A4B-04F8-4611-9407-6DB017F4B4FB}" type="slidenum">
               <a:rPr lang="de-DE" smtClean="0"/>
-              <a:t>‹#›</a:t>
+              <a:pPr/>
+              <a:t>‹Nr.›</a:t>
             </a:fld>
             <a:endParaRPr lang="de-DE"/>
           </a:p>
@@ -1659,7 +1668,7 @@
     </p:spTree>
     <p:extLst>
       <p:ext uri="{BB962C8B-B14F-4D97-AF65-F5344CB8AC3E}">
-        <p14:creationId xmlns:p14="http://schemas.microsoft.com/office/powerpoint/2010/main" val="3177642577"/>
+        <p14:creationId xmlns:p14="http://schemas.microsoft.com/office/powerpoint/2010/main" xmlns="" val="3177642577"/>
       </p:ext>
     </p:extLst>
   </p:cSld>
@@ -2148,6 +2157,7 @@
           <a:p>
             <a:fld id="{3054CC92-5314-4B8F-855A-57F1C5108CE2}" type="datetime1">
               <a:rPr lang="de-DE" smtClean="0"/>
+              <a:pPr/>
               <a:t>14.11.2016</a:t>
             </a:fld>
             <a:endParaRPr lang="de-DE"/>
@@ -2190,7 +2200,8 @@
           <a:p>
             <a:fld id="{5E680A4B-04F8-4611-9407-6DB017F4B4FB}" type="slidenum">
               <a:rPr lang="de-DE" smtClean="0"/>
-              <a:t>‹#›</a:t>
+              <a:pPr/>
+              <a:t>‹Nr.›</a:t>
             </a:fld>
             <a:endParaRPr lang="de-DE"/>
           </a:p>
@@ -2199,7 +2210,7 @@
     </p:spTree>
     <p:extLst>
       <p:ext uri="{BB962C8B-B14F-4D97-AF65-F5344CB8AC3E}">
-        <p14:creationId xmlns:p14="http://schemas.microsoft.com/office/powerpoint/2010/main" val="1730099162"/>
+        <p14:creationId xmlns:p14="http://schemas.microsoft.com/office/powerpoint/2010/main" xmlns="" val="1730099162"/>
       </p:ext>
     </p:extLst>
   </p:cSld>
@@ -2396,6 +2407,7 @@
           <a:p>
             <a:fld id="{E85E5EB9-E8E3-460B-9B5B-4947844CB8D8}" type="datetime1">
               <a:rPr lang="de-DE" smtClean="0"/>
+              <a:pPr/>
               <a:t>14.11.2016</a:t>
             </a:fld>
             <a:endParaRPr lang="de-DE"/>
@@ -2438,7 +2450,8 @@
           <a:p>
             <a:fld id="{5E680A4B-04F8-4611-9407-6DB017F4B4FB}" type="slidenum">
               <a:rPr lang="de-DE" smtClean="0"/>
-              <a:t>‹#›</a:t>
+              <a:pPr/>
+              <a:t>‹Nr.›</a:t>
             </a:fld>
             <a:endParaRPr lang="de-DE"/>
           </a:p>
@@ -2447,7 +2460,7 @@
     </p:spTree>
     <p:extLst>
       <p:ext uri="{BB962C8B-B14F-4D97-AF65-F5344CB8AC3E}">
-        <p14:creationId xmlns:p14="http://schemas.microsoft.com/office/powerpoint/2010/main" val="1872651128"/>
+        <p14:creationId xmlns:p14="http://schemas.microsoft.com/office/powerpoint/2010/main" xmlns="" val="1872651128"/>
       </p:ext>
     </p:extLst>
   </p:cSld>
@@ -2928,6 +2941,7 @@
           <a:p>
             <a:fld id="{94FE7C9C-0714-4BEE-A34E-7E56EE413791}" type="datetime1">
               <a:rPr lang="de-DE" smtClean="0"/>
+              <a:pPr/>
               <a:t>14.11.2016</a:t>
             </a:fld>
             <a:endParaRPr lang="de-DE"/>
@@ -2970,7 +2984,8 @@
           <a:p>
             <a:fld id="{5E680A4B-04F8-4611-9407-6DB017F4B4FB}" type="slidenum">
               <a:rPr lang="de-DE" smtClean="0"/>
-              <a:t>‹#›</a:t>
+              <a:pPr/>
+              <a:t>‹Nr.›</a:t>
             </a:fld>
             <a:endParaRPr lang="de-DE"/>
           </a:p>
@@ -2979,7 +2994,7 @@
     </p:spTree>
     <p:extLst>
       <p:ext uri="{BB962C8B-B14F-4D97-AF65-F5344CB8AC3E}">
-        <p14:creationId xmlns:p14="http://schemas.microsoft.com/office/powerpoint/2010/main" val="2542063763"/>
+        <p14:creationId xmlns:p14="http://schemas.microsoft.com/office/powerpoint/2010/main" xmlns="" val="2542063763"/>
       </p:ext>
     </p:extLst>
   </p:cSld>
@@ -3225,6 +3240,7 @@
           <a:p>
             <a:fld id="{A1F1E9FC-B976-4C6B-B311-5308184ACA9D}" type="datetime1">
               <a:rPr lang="de-DE" smtClean="0"/>
+              <a:pPr/>
               <a:t>14.11.2016</a:t>
             </a:fld>
             <a:endParaRPr lang="de-DE"/>
@@ -3267,7 +3283,8 @@
           <a:p>
             <a:fld id="{5E680A4B-04F8-4611-9407-6DB017F4B4FB}" type="slidenum">
               <a:rPr lang="de-DE" smtClean="0"/>
-              <a:t>‹#›</a:t>
+              <a:pPr/>
+              <a:t>‹Nr.›</a:t>
             </a:fld>
             <a:endParaRPr lang="de-DE"/>
           </a:p>
@@ -3276,7 +3293,7 @@
     </p:spTree>
     <p:extLst>
       <p:ext uri="{BB962C8B-B14F-4D97-AF65-F5344CB8AC3E}">
-        <p14:creationId xmlns:p14="http://schemas.microsoft.com/office/powerpoint/2010/main" val="3759483857"/>
+        <p14:creationId xmlns:p14="http://schemas.microsoft.com/office/powerpoint/2010/main" xmlns="" val="3759483857"/>
       </p:ext>
     </p:extLst>
   </p:cSld>
@@ -3399,6 +3416,7 @@
           <a:p>
             <a:fld id="{8F6B0C72-844E-434D-9E18-FC5BC88335A3}" type="datetime1">
               <a:rPr lang="de-DE" smtClean="0"/>
+              <a:pPr/>
               <a:t>14.11.2016</a:t>
             </a:fld>
             <a:endParaRPr lang="de-DE"/>
@@ -3441,7 +3459,8 @@
           <a:p>
             <a:fld id="{5E680A4B-04F8-4611-9407-6DB017F4B4FB}" type="slidenum">
               <a:rPr lang="de-DE" smtClean="0"/>
-              <a:t>‹#›</a:t>
+              <a:pPr/>
+              <a:t>‹Nr.›</a:t>
             </a:fld>
             <a:endParaRPr lang="de-DE"/>
           </a:p>
@@ -3450,7 +3469,7 @@
     </p:spTree>
     <p:extLst>
       <p:ext uri="{BB962C8B-B14F-4D97-AF65-F5344CB8AC3E}">
-        <p14:creationId xmlns:p14="http://schemas.microsoft.com/office/powerpoint/2010/main" val="1415154336"/>
+        <p14:creationId xmlns:p14="http://schemas.microsoft.com/office/powerpoint/2010/main" xmlns="" val="1415154336"/>
       </p:ext>
     </p:extLst>
   </p:cSld>
@@ -3579,6 +3598,7 @@
           <a:p>
             <a:fld id="{485BDF62-DE56-448A-A095-159C306F5918}" type="datetime1">
               <a:rPr lang="de-DE" smtClean="0"/>
+              <a:pPr/>
               <a:t>14.11.2016</a:t>
             </a:fld>
             <a:endParaRPr lang="de-DE"/>
@@ -3621,7 +3641,8 @@
           <a:p>
             <a:fld id="{5E680A4B-04F8-4611-9407-6DB017F4B4FB}" type="slidenum">
               <a:rPr lang="de-DE" smtClean="0"/>
-              <a:t>‹#›</a:t>
+              <a:pPr/>
+              <a:t>‹Nr.›</a:t>
             </a:fld>
             <a:endParaRPr lang="de-DE"/>
           </a:p>
@@ -3630,7 +3651,7 @@
     </p:spTree>
     <p:extLst>
       <p:ext uri="{BB962C8B-B14F-4D97-AF65-F5344CB8AC3E}">
-        <p14:creationId xmlns:p14="http://schemas.microsoft.com/office/powerpoint/2010/main" val="3489344004"/>
+        <p14:creationId xmlns:p14="http://schemas.microsoft.com/office/powerpoint/2010/main" xmlns="" val="3489344004"/>
       </p:ext>
     </p:extLst>
   </p:cSld>
@@ -3749,6 +3770,7 @@
           <a:p>
             <a:fld id="{154B31D8-F168-4400-AF14-9744A499D537}" type="datetime1">
               <a:rPr lang="de-DE" smtClean="0"/>
+              <a:pPr/>
               <a:t>14.11.2016</a:t>
             </a:fld>
             <a:endParaRPr lang="de-DE"/>
@@ -3796,7 +3818,8 @@
           <a:p>
             <a:fld id="{5E680A4B-04F8-4611-9407-6DB017F4B4FB}" type="slidenum">
               <a:rPr lang="de-DE" smtClean="0"/>
-              <a:t>‹#›</a:t>
+              <a:pPr/>
+              <a:t>‹Nr.›</a:t>
             </a:fld>
             <a:endParaRPr lang="de-DE"/>
           </a:p>
@@ -3805,7 +3828,7 @@
     </p:spTree>
     <p:extLst>
       <p:ext uri="{BB962C8B-B14F-4D97-AF65-F5344CB8AC3E}">
-        <p14:creationId xmlns:p14="http://schemas.microsoft.com/office/powerpoint/2010/main" val="1647927618"/>
+        <p14:creationId xmlns:p14="http://schemas.microsoft.com/office/powerpoint/2010/main" xmlns="" val="1647927618"/>
       </p:ext>
     </p:extLst>
   </p:cSld>
@@ -4000,6 +4023,7 @@
           <a:p>
             <a:fld id="{27CD9C2C-C3B4-455B-AC6D-27AFFEE32011}" type="datetime1">
               <a:rPr lang="de-DE" smtClean="0"/>
+              <a:pPr/>
               <a:t>14.11.2016</a:t>
             </a:fld>
             <a:endParaRPr lang="de-DE"/>
@@ -4042,7 +4066,8 @@
           <a:p>
             <a:fld id="{5E680A4B-04F8-4611-9407-6DB017F4B4FB}" type="slidenum">
               <a:rPr lang="de-DE" smtClean="0"/>
-              <a:t>‹#›</a:t>
+              <a:pPr/>
+              <a:t>‹Nr.›</a:t>
             </a:fld>
             <a:endParaRPr lang="de-DE"/>
           </a:p>
@@ -4051,7 +4076,7 @@
     </p:spTree>
     <p:extLst>
       <p:ext uri="{BB962C8B-B14F-4D97-AF65-F5344CB8AC3E}">
-        <p14:creationId xmlns:p14="http://schemas.microsoft.com/office/powerpoint/2010/main" val="1118857333"/>
+        <p14:creationId xmlns:p14="http://schemas.microsoft.com/office/powerpoint/2010/main" xmlns="" val="1118857333"/>
       </p:ext>
     </p:extLst>
   </p:cSld>
@@ -4297,6 +4322,7 @@
           <a:p>
             <a:fld id="{120E6395-E734-4705-AB1E-54638CF052E6}" type="datetime1">
               <a:rPr lang="de-DE" smtClean="0"/>
+              <a:pPr/>
               <a:t>14.11.2016</a:t>
             </a:fld>
             <a:endParaRPr lang="de-DE"/>
@@ -4339,7 +4365,8 @@
           <a:p>
             <a:fld id="{5E680A4B-04F8-4611-9407-6DB017F4B4FB}" type="slidenum">
               <a:rPr lang="de-DE" smtClean="0"/>
-              <a:t>‹#›</a:t>
+              <a:pPr/>
+              <a:t>‹Nr.›</a:t>
             </a:fld>
             <a:endParaRPr lang="de-DE"/>
           </a:p>
@@ -4348,7 +4375,7 @@
     </p:spTree>
     <p:extLst>
       <p:ext uri="{BB962C8B-B14F-4D97-AF65-F5344CB8AC3E}">
-        <p14:creationId xmlns:p14="http://schemas.microsoft.com/office/powerpoint/2010/main" val="1343002119"/>
+        <p14:creationId xmlns:p14="http://schemas.microsoft.com/office/powerpoint/2010/main" xmlns="" val="1343002119"/>
       </p:ext>
     </p:extLst>
   </p:cSld>
@@ -4739,6 +4766,7 @@
           <a:p>
             <a:fld id="{72178AAD-8815-44E1-86EE-2FF0204E6D05}" type="datetime1">
               <a:rPr lang="de-DE" smtClean="0"/>
+              <a:pPr/>
               <a:t>14.11.2016</a:t>
             </a:fld>
             <a:endParaRPr lang="de-DE"/>
@@ -4781,7 +4809,8 @@
           <a:p>
             <a:fld id="{5E680A4B-04F8-4611-9407-6DB017F4B4FB}" type="slidenum">
               <a:rPr lang="de-DE" smtClean="0"/>
-              <a:t>‹#›</a:t>
+              <a:pPr/>
+              <a:t>‹Nr.›</a:t>
             </a:fld>
             <a:endParaRPr lang="de-DE"/>
           </a:p>
@@ -4790,7 +4819,7 @@
     </p:spTree>
     <p:extLst>
       <p:ext uri="{BB962C8B-B14F-4D97-AF65-F5344CB8AC3E}">
-        <p14:creationId xmlns:p14="http://schemas.microsoft.com/office/powerpoint/2010/main" val="2472565295"/>
+        <p14:creationId xmlns:p14="http://schemas.microsoft.com/office/powerpoint/2010/main" xmlns="" val="2472565295"/>
       </p:ext>
     </p:extLst>
   </p:cSld>
@@ -4857,6 +4886,7 @@
           <a:p>
             <a:fld id="{E81F12A4-33F2-4E90-A511-CF5361372D74}" type="datetime1">
               <a:rPr lang="de-DE" smtClean="0"/>
+              <a:pPr/>
               <a:t>14.11.2016</a:t>
             </a:fld>
             <a:endParaRPr lang="de-DE"/>
@@ -4899,7 +4929,8 @@
           <a:p>
             <a:fld id="{5E680A4B-04F8-4611-9407-6DB017F4B4FB}" type="slidenum">
               <a:rPr lang="de-DE" smtClean="0"/>
-              <a:t>‹#›</a:t>
+              <a:pPr/>
+              <a:t>‹Nr.›</a:t>
             </a:fld>
             <a:endParaRPr lang="de-DE"/>
           </a:p>
@@ -4908,7 +4939,7 @@
     </p:spTree>
     <p:extLst>
       <p:ext uri="{BB962C8B-B14F-4D97-AF65-F5344CB8AC3E}">
-        <p14:creationId xmlns:p14="http://schemas.microsoft.com/office/powerpoint/2010/main" val="1706458807"/>
+        <p14:creationId xmlns:p14="http://schemas.microsoft.com/office/powerpoint/2010/main" xmlns="" val="1706458807"/>
       </p:ext>
     </p:extLst>
   </p:cSld>
@@ -4952,6 +4983,7 @@
           <a:p>
             <a:fld id="{29C260DD-4A9E-4A3C-97A4-40AB41BC3A41}" type="datetime1">
               <a:rPr lang="de-DE" smtClean="0"/>
+              <a:pPr/>
               <a:t>14.11.2016</a:t>
             </a:fld>
             <a:endParaRPr lang="de-DE"/>
@@ -4994,7 +5026,8 @@
           <a:p>
             <a:fld id="{5E680A4B-04F8-4611-9407-6DB017F4B4FB}" type="slidenum">
               <a:rPr lang="de-DE" smtClean="0"/>
-              <a:t>‹#›</a:t>
+              <a:pPr/>
+              <a:t>‹Nr.›</a:t>
             </a:fld>
             <a:endParaRPr lang="de-DE"/>
           </a:p>
@@ -5003,7 +5036,7 @@
     </p:spTree>
     <p:extLst>
       <p:ext uri="{BB962C8B-B14F-4D97-AF65-F5344CB8AC3E}">
-        <p14:creationId xmlns:p14="http://schemas.microsoft.com/office/powerpoint/2010/main" val="375913772"/>
+        <p14:creationId xmlns:p14="http://schemas.microsoft.com/office/powerpoint/2010/main" xmlns="" val="375913772"/>
       </p:ext>
     </p:extLst>
   </p:cSld>
@@ -5235,6 +5268,7 @@
           <a:p>
             <a:fld id="{1E59BCE2-1AEC-4112-867D-67B9D9F15167}" type="datetime1">
               <a:rPr lang="de-DE" smtClean="0"/>
+              <a:pPr/>
               <a:t>14.11.2016</a:t>
             </a:fld>
             <a:endParaRPr lang="de-DE"/>
@@ -5277,7 +5311,8 @@
           <a:p>
             <a:fld id="{5E680A4B-04F8-4611-9407-6DB017F4B4FB}" type="slidenum">
               <a:rPr lang="de-DE" smtClean="0"/>
-              <a:t>‹#›</a:t>
+              <a:pPr/>
+              <a:t>‹Nr.›</a:t>
             </a:fld>
             <a:endParaRPr lang="de-DE"/>
           </a:p>
@@ -5286,7 +5321,7 @@
     </p:spTree>
     <p:extLst>
       <p:ext uri="{BB962C8B-B14F-4D97-AF65-F5344CB8AC3E}">
-        <p14:creationId xmlns:p14="http://schemas.microsoft.com/office/powerpoint/2010/main" val="494251690"/>
+        <p14:creationId xmlns:p14="http://schemas.microsoft.com/office/powerpoint/2010/main" xmlns="" val="494251690"/>
       </p:ext>
     </p:extLst>
   </p:cSld>
@@ -5526,6 +5561,7 @@
           <a:p>
             <a:fld id="{6DC1D8F0-B9AC-4E24-ABD8-A8F43A511FED}" type="datetime1">
               <a:rPr lang="de-DE" smtClean="0"/>
+              <a:pPr/>
               <a:t>14.11.2016</a:t>
             </a:fld>
             <a:endParaRPr lang="de-DE"/>
@@ -5568,7 +5604,8 @@
           <a:p>
             <a:fld id="{5E680A4B-04F8-4611-9407-6DB017F4B4FB}" type="slidenum">
               <a:rPr lang="de-DE" smtClean="0"/>
-              <a:t>‹#›</a:t>
+              <a:pPr/>
+              <a:t>‹Nr.›</a:t>
             </a:fld>
             <a:endParaRPr lang="de-DE"/>
           </a:p>
@@ -5577,7 +5614,7 @@
     </p:spTree>
     <p:extLst>
       <p:ext uri="{BB962C8B-B14F-4D97-AF65-F5344CB8AC3E}">
-        <p14:creationId xmlns:p14="http://schemas.microsoft.com/office/powerpoint/2010/main" val="2769730647"/>
+        <p14:creationId xmlns:p14="http://schemas.microsoft.com/office/powerpoint/2010/main" xmlns="" val="2769730647"/>
       </p:ext>
     </p:extLst>
   </p:cSld>
@@ -6056,6 +6093,7 @@
           <a:p>
             <a:fld id="{DE9924B6-0A84-4C86-9685-1990A0BD828C}" type="datetime1">
               <a:rPr lang="de-DE" smtClean="0"/>
+              <a:pPr/>
               <a:t>14.11.2016</a:t>
             </a:fld>
             <a:endParaRPr lang="de-DE"/>
@@ -6134,7 +6172,8 @@
           <a:p>
             <a:fld id="{5E680A4B-04F8-4611-9407-6DB017F4B4FB}" type="slidenum">
               <a:rPr lang="de-DE" smtClean="0"/>
-              <a:t>‹#›</a:t>
+              <a:pPr/>
+              <a:t>‹Nr.›</a:t>
             </a:fld>
             <a:endParaRPr lang="de-DE"/>
           </a:p>
@@ -6143,7 +6182,7 @@
     </p:spTree>
     <p:extLst>
       <p:ext uri="{BB962C8B-B14F-4D97-AF65-F5344CB8AC3E}">
-        <p14:creationId xmlns:p14="http://schemas.microsoft.com/office/powerpoint/2010/main" val="39046388"/>
+        <p14:creationId xmlns:p14="http://schemas.microsoft.com/office/powerpoint/2010/main" xmlns="" val="39046388"/>
       </p:ext>
     </p:extLst>
   </p:cSld>
@@ -6657,7 +6696,7 @@
     </p:spTree>
     <p:extLst>
       <p:ext uri="{BB962C8B-B14F-4D97-AF65-F5344CB8AC3E}">
-        <p14:creationId xmlns:p14="http://schemas.microsoft.com/office/powerpoint/2010/main" val="1837516164"/>
+        <p14:creationId xmlns:p14="http://schemas.microsoft.com/office/powerpoint/2010/main" xmlns="" val="1837516164"/>
       </p:ext>
     </p:extLst>
   </p:cSld>
@@ -6726,7 +6765,6 @@
               <a:rPr lang="de-DE" dirty="0" smtClean="0"/>
               <a:t>Taktstraße</a:t>
             </a:r>
-            <a:endParaRPr lang="de-DE" dirty="0" smtClean="0"/>
           </a:p>
           <a:p>
             <a:r>
@@ -6775,6 +6813,7 @@
           <a:p>
             <a:fld id="{5E680A4B-04F8-4611-9407-6DB017F4B4FB}" type="slidenum">
               <a:rPr lang="de-DE" smtClean="0"/>
+              <a:pPr/>
               <a:t>10</a:t>
             </a:fld>
             <a:endParaRPr lang="de-DE"/>
@@ -6784,7 +6823,7 @@
     </p:spTree>
     <p:extLst>
       <p:ext uri="{BB962C8B-B14F-4D97-AF65-F5344CB8AC3E}">
-        <p14:creationId xmlns:p14="http://schemas.microsoft.com/office/powerpoint/2010/main" val="1998128531"/>
+        <p14:creationId xmlns:p14="http://schemas.microsoft.com/office/powerpoint/2010/main" xmlns="" val="1998128531"/>
       </p:ext>
     </p:extLst>
   </p:cSld>
@@ -6874,6 +6913,7 @@
           <a:p>
             <a:fld id="{5E680A4B-04F8-4611-9407-6DB017F4B4FB}" type="slidenum">
               <a:rPr lang="de-DE" smtClean="0"/>
+              <a:pPr/>
               <a:t>11</a:t>
             </a:fld>
             <a:endParaRPr lang="de-DE"/>
@@ -6883,7 +6923,7 @@
     </p:spTree>
     <p:extLst>
       <p:ext uri="{BB962C8B-B14F-4D97-AF65-F5344CB8AC3E}">
-        <p14:creationId xmlns:p14="http://schemas.microsoft.com/office/powerpoint/2010/main" val="214549362"/>
+        <p14:creationId xmlns:p14="http://schemas.microsoft.com/office/powerpoint/2010/main" xmlns="" val="214549362"/>
       </p:ext>
     </p:extLst>
   </p:cSld>
@@ -6973,6 +7013,7 @@
           <a:p>
             <a:fld id="{5E680A4B-04F8-4611-9407-6DB017F4B4FB}" type="slidenum">
               <a:rPr lang="de-DE" smtClean="0"/>
+              <a:pPr/>
               <a:t>12</a:t>
             </a:fld>
             <a:endParaRPr lang="de-DE"/>
@@ -6982,7 +7023,7 @@
     </p:spTree>
     <p:extLst>
       <p:ext uri="{BB962C8B-B14F-4D97-AF65-F5344CB8AC3E}">
-        <p14:creationId xmlns:p14="http://schemas.microsoft.com/office/powerpoint/2010/main" val="2213054590"/>
+        <p14:creationId xmlns:p14="http://schemas.microsoft.com/office/powerpoint/2010/main" xmlns="" val="2213054590"/>
       </p:ext>
     </p:extLst>
   </p:cSld>
@@ -7086,6 +7127,7 @@
           <a:p>
             <a:fld id="{5E680A4B-04F8-4611-9407-6DB017F4B4FB}" type="slidenum">
               <a:rPr lang="de-DE" smtClean="0"/>
+              <a:pPr/>
               <a:t>13</a:t>
             </a:fld>
             <a:endParaRPr lang="de-DE"/>
@@ -7095,7 +7137,7 @@
     </p:spTree>
     <p:extLst>
       <p:ext uri="{BB962C8B-B14F-4D97-AF65-F5344CB8AC3E}">
-        <p14:creationId xmlns:p14="http://schemas.microsoft.com/office/powerpoint/2010/main" val="3770692475"/>
+        <p14:creationId xmlns:p14="http://schemas.microsoft.com/office/powerpoint/2010/main" xmlns="" val="3770692475"/>
       </p:ext>
     </p:extLst>
   </p:cSld>
@@ -7175,7 +7217,7 @@
     </p:spTree>
     <p:extLst>
       <p:ext uri="{BB962C8B-B14F-4D97-AF65-F5344CB8AC3E}">
-        <p14:creationId xmlns:p14="http://schemas.microsoft.com/office/powerpoint/2010/main" val="3847764497"/>
+        <p14:creationId xmlns:p14="http://schemas.microsoft.com/office/powerpoint/2010/main" xmlns="" val="3847764497"/>
       </p:ext>
     </p:extLst>
   </p:cSld>
@@ -7257,7 +7299,6 @@
               <a:rPr lang="de-DE" dirty="0" smtClean="0"/>
               <a:t>Taktstraße</a:t>
             </a:r>
-            <a:endParaRPr lang="de-DE" dirty="0" smtClean="0"/>
           </a:p>
           <a:p>
             <a:r>
@@ -7285,6 +7326,7 @@
           <a:p>
             <a:fld id="{5E680A4B-04F8-4611-9407-6DB017F4B4FB}" type="slidenum">
               <a:rPr lang="de-DE" smtClean="0"/>
+              <a:pPr/>
               <a:t>2</a:t>
             </a:fld>
             <a:endParaRPr lang="de-DE"/>
@@ -7294,7 +7336,7 @@
     </p:spTree>
     <p:extLst>
       <p:ext uri="{BB962C8B-B14F-4D97-AF65-F5344CB8AC3E}">
-        <p14:creationId xmlns:p14="http://schemas.microsoft.com/office/powerpoint/2010/main" val="4117385807"/>
+        <p14:creationId xmlns:p14="http://schemas.microsoft.com/office/powerpoint/2010/main" xmlns="" val="4117385807"/>
       </p:ext>
     </p:extLst>
   </p:cSld>
@@ -7363,7 +7405,15 @@
           <a:p>
             <a:r>
               <a:rPr lang="de-DE" dirty="0" smtClean="0"/>
-              <a:t>Daten von Reichwalt bekommen</a:t>
+              <a:t>Daten von </a:t>
+            </a:r>
+            <a:r>
+              <a:rPr lang="de-DE" dirty="0" smtClean="0"/>
+              <a:t>Reichwald </a:t>
+            </a:r>
+            <a:r>
+              <a:rPr lang="de-DE" dirty="0" smtClean="0"/>
+              <a:t>bekommen</a:t>
             </a:r>
           </a:p>
           <a:p>
@@ -7371,7 +7421,6 @@
               <a:rPr lang="de-DE" dirty="0" smtClean="0"/>
               <a:t>Taktstraßensimulation</a:t>
             </a:r>
-            <a:endParaRPr lang="de-DE" dirty="0" smtClean="0"/>
           </a:p>
           <a:p>
             <a:r>
@@ -7438,6 +7487,7 @@
           <a:p>
             <a:fld id="{5E680A4B-04F8-4611-9407-6DB017F4B4FB}" type="slidenum">
               <a:rPr lang="de-DE" smtClean="0"/>
+              <a:pPr/>
               <a:t>3</a:t>
             </a:fld>
             <a:endParaRPr lang="de-DE"/>
@@ -7447,7 +7497,7 @@
     </p:spTree>
     <p:extLst>
       <p:ext uri="{BB962C8B-B14F-4D97-AF65-F5344CB8AC3E}">
-        <p14:creationId xmlns:p14="http://schemas.microsoft.com/office/powerpoint/2010/main" val="2098260736"/>
+        <p14:creationId xmlns:p14="http://schemas.microsoft.com/office/powerpoint/2010/main" xmlns="" val="2098260736"/>
       </p:ext>
     </p:extLst>
   </p:cSld>
@@ -7523,14 +7573,24 @@
           <a:p>
             <a:r>
               <a:rPr lang="de-DE" dirty="0" smtClean="0"/>
-              <a:t>Daten von Reichwalt</a:t>
-            </a:r>
-          </a:p>
-          <a:p>
+              <a:t>Daten von </a:t>
+            </a:r>
             <a:r>
               <a:rPr lang="de-DE" dirty="0" smtClean="0"/>
-              <a:t>Kafka Docker von Reichwalt</a:t>
-            </a:r>
+              <a:t>Reichwald</a:t>
+            </a:r>
+            <a:endParaRPr lang="de-DE" dirty="0" smtClean="0"/>
+          </a:p>
+          <a:p>
+            <a:r>
+              <a:rPr lang="de-DE" dirty="0" smtClean="0"/>
+              <a:t>Kafka Docker von </a:t>
+            </a:r>
+            <a:r>
+              <a:rPr lang="de-DE" dirty="0" smtClean="0"/>
+              <a:t>Reichwald</a:t>
+            </a:r>
+            <a:endParaRPr lang="de-DE" dirty="0" smtClean="0"/>
           </a:p>
           <a:p>
             <a:r>
@@ -7545,8 +7605,13 @@
             </a:r>
             <a:r>
               <a:rPr lang="de-DE" dirty="0" smtClean="0"/>
-              <a:t> von Reichwalt</a:t>
-            </a:r>
+              <a:t> von </a:t>
+            </a:r>
+            <a:r>
+              <a:rPr lang="de-DE" dirty="0" smtClean="0"/>
+              <a:t>Reichwald</a:t>
+            </a:r>
+            <a:endParaRPr lang="de-DE" dirty="0" smtClean="0"/>
           </a:p>
           <a:p>
             <a:r>
@@ -7592,6 +7657,7 @@
           <a:p>
             <a:fld id="{5E680A4B-04F8-4611-9407-6DB017F4B4FB}" type="slidenum">
               <a:rPr lang="de-DE" smtClean="0"/>
+              <a:pPr/>
               <a:t>4</a:t>
             </a:fld>
             <a:endParaRPr lang="de-DE"/>
@@ -7601,7 +7667,7 @@
     </p:spTree>
     <p:extLst>
       <p:ext uri="{BB962C8B-B14F-4D97-AF65-F5344CB8AC3E}">
-        <p14:creationId xmlns:p14="http://schemas.microsoft.com/office/powerpoint/2010/main" val="3168614985"/>
+        <p14:creationId xmlns:p14="http://schemas.microsoft.com/office/powerpoint/2010/main" xmlns="" val="3168614985"/>
       </p:ext>
     </p:extLst>
   </p:cSld>
@@ -7699,6 +7765,7 @@
           <a:p>
             <a:fld id="{5E680A4B-04F8-4611-9407-6DB017F4B4FB}" type="slidenum">
               <a:rPr lang="de-DE" smtClean="0"/>
+              <a:pPr/>
               <a:t>5</a:t>
             </a:fld>
             <a:endParaRPr lang="de-DE"/>
@@ -7708,7 +7775,7 @@
     </p:spTree>
     <p:extLst>
       <p:ext uri="{BB962C8B-B14F-4D97-AF65-F5344CB8AC3E}">
-        <p14:creationId xmlns:p14="http://schemas.microsoft.com/office/powerpoint/2010/main" val="1281620257"/>
+        <p14:creationId xmlns:p14="http://schemas.microsoft.com/office/powerpoint/2010/main" xmlns="" val="1281620257"/>
       </p:ext>
     </p:extLst>
   </p:cSld>
@@ -7825,6 +7892,7 @@
           <a:p>
             <a:fld id="{5E680A4B-04F8-4611-9407-6DB017F4B4FB}" type="slidenum">
               <a:rPr lang="de-DE" smtClean="0"/>
+              <a:pPr/>
               <a:t>6</a:t>
             </a:fld>
             <a:endParaRPr lang="de-DE"/>
@@ -7834,7 +7902,7 @@
     </p:spTree>
     <p:extLst>
       <p:ext uri="{BB962C8B-B14F-4D97-AF65-F5344CB8AC3E}">
-        <p14:creationId xmlns:p14="http://schemas.microsoft.com/office/powerpoint/2010/main" val="1348452335"/>
+        <p14:creationId xmlns:p14="http://schemas.microsoft.com/office/powerpoint/2010/main" xmlns="" val="1348452335"/>
       </p:ext>
     </p:extLst>
   </p:cSld>
@@ -7901,11 +7969,7 @@
           <a:p>
             <a:r>
               <a:rPr lang="de-DE" dirty="0" smtClean="0"/>
-              <a:t>Simulation für die </a:t>
-            </a:r>
-            <a:r>
-              <a:rPr lang="de-DE" dirty="0" smtClean="0"/>
-              <a:t>Taktstraße</a:t>
+              <a:t>Simulation für die Taktstraße</a:t>
             </a:r>
             <a:endParaRPr lang="de-DE" dirty="0"/>
           </a:p>
@@ -7928,6 +7992,7 @@
           <a:p>
             <a:fld id="{5E680A4B-04F8-4611-9407-6DB017F4B4FB}" type="slidenum">
               <a:rPr lang="de-DE" smtClean="0"/>
+              <a:pPr/>
               <a:t>7</a:t>
             </a:fld>
             <a:endParaRPr lang="de-DE"/>
@@ -7937,7 +8002,7 @@
     </p:spTree>
     <p:extLst>
       <p:ext uri="{BB962C8B-B14F-4D97-AF65-F5344CB8AC3E}">
-        <p14:creationId xmlns:p14="http://schemas.microsoft.com/office/powerpoint/2010/main" val="3879383194"/>
+        <p14:creationId xmlns:p14="http://schemas.microsoft.com/office/powerpoint/2010/main" xmlns="" val="3879383194"/>
       </p:ext>
     </p:extLst>
   </p:cSld>
@@ -8067,6 +8132,7 @@
           <a:p>
             <a:fld id="{5E680A4B-04F8-4611-9407-6DB017F4B4FB}" type="slidenum">
               <a:rPr lang="de-DE" smtClean="0"/>
+              <a:pPr/>
               <a:t>8</a:t>
             </a:fld>
             <a:endParaRPr lang="de-DE"/>
@@ -8076,7 +8142,7 @@
     </p:spTree>
     <p:extLst>
       <p:ext uri="{BB962C8B-B14F-4D97-AF65-F5344CB8AC3E}">
-        <p14:creationId xmlns:p14="http://schemas.microsoft.com/office/powerpoint/2010/main" val="692777740"/>
+        <p14:creationId xmlns:p14="http://schemas.microsoft.com/office/powerpoint/2010/main" xmlns="" val="692777740"/>
       </p:ext>
     </p:extLst>
   </p:cSld>
@@ -8186,6 +8252,7 @@
           <a:p>
             <a:fld id="{5E680A4B-04F8-4611-9407-6DB017F4B4FB}" type="slidenum">
               <a:rPr lang="de-DE" smtClean="0"/>
+              <a:pPr/>
               <a:t>9</a:t>
             </a:fld>
             <a:endParaRPr lang="de-DE"/>
@@ -8195,7 +8262,7 @@
     </p:spTree>
     <p:extLst>
       <p:ext uri="{BB962C8B-B14F-4D97-AF65-F5344CB8AC3E}">
-        <p14:creationId xmlns:p14="http://schemas.microsoft.com/office/powerpoint/2010/main" val="4255349386"/>
+        <p14:creationId xmlns:p14="http://schemas.microsoft.com/office/powerpoint/2010/main" xmlns="" val="4255349386"/>
       </p:ext>
     </p:extLst>
   </p:cSld>
@@ -8248,7 +8315,7 @@
     </a:clrScheme>
     <a:fontScheme name="Parallax">
       <a:majorFont>
-        <a:latin typeface="Corbel" panose="020B0503020204020204"/>
+        <a:latin typeface="Corbel"/>
         <a:ea typeface=""/>
         <a:cs typeface=""/>
         <a:font script="Jpan" typeface="HGｺﾞｼｯｸM"/>
@@ -8283,7 +8350,7 @@
         <a:font script="Geor" typeface="Sylfaen"/>
       </a:majorFont>
       <a:minorFont>
-        <a:latin typeface="Corbel" panose="020B0503020204020204"/>
+        <a:latin typeface="Corbel"/>
         <a:ea typeface=""/>
         <a:cs typeface=""/>
         <a:font script="Jpan" typeface="HGｺﾞｼｯｸM"/>
@@ -8455,7 +8522,7 @@
   <a:extraClrSchemeLst/>
   <a:extLst>
     <a:ext uri="{05A4C25C-085E-4340-85A3-A5531E510DB2}">
-      <thm15:themeFamily xmlns:thm15="http://schemas.microsoft.com/office/thememl/2012/main" name="Parallax" id="{3388167B-A2EB-4685-9635-1831D9AEF8C4}" vid="{4F7A876A-7598-49CA-AFC8-8EDA2551E4A7}"/>
+      <thm15:themeFamily xmlns:thm15="http://schemas.microsoft.com/office/thememl/2012/main" xmlns="" name="Parallax" id="{3388167B-A2EB-4685-9635-1831D9AEF8C4}" vid="{4F7A876A-7598-49CA-AFC8-8EDA2551E4A7}"/>
     </a:ext>
   </a:extLst>
 </a:theme>
@@ -8504,7 +8571,7 @@
     </a:clrScheme>
     <a:fontScheme name="Office">
       <a:majorFont>
-        <a:latin typeface="Calibri Light" panose="020F0302020204030204"/>
+        <a:latin typeface="Calibri Light"/>
         <a:ea typeface=""/>
         <a:cs typeface=""/>
         <a:font script="Jpan" typeface="ＭＳ Ｐゴシック"/>
@@ -8539,7 +8606,7 @@
         <a:font script="Geor" typeface="Sylfaen"/>
       </a:majorFont>
       <a:minorFont>
-        <a:latin typeface="Calibri" panose="020F0502020204030204"/>
+        <a:latin typeface="Calibri"/>
         <a:ea typeface=""/>
         <a:cs typeface=""/>
         <a:font script="Jpan" typeface="ＭＳ Ｐゴシック"/>
@@ -8716,7 +8783,7 @@
   <a:extraClrSchemeLst/>
   <a:extLst>
     <a:ext uri="{05A4C25C-085E-4340-85A3-A5531E510DB2}">
-      <thm15:themeFamily xmlns:thm15="http://schemas.microsoft.com/office/thememl/2012/main" name="Office Theme" id="{62F939B6-93AF-4DB8-9C6B-D6C7DFDC589F}" vid="{4A3C46E8-61CC-4603-A589-7422A47A8E4A}"/>
+      <thm15:themeFamily xmlns:thm15="http://schemas.microsoft.com/office/thememl/2012/main" xmlns="" name="Office Theme" id="{62F939B6-93AF-4DB8-9C6B-D6C7DFDC589F}" vid="{4A3C46E8-61CC-4603-A589-7422A47A8E4A}"/>
     </a:ext>
   </a:extLst>
 </a:theme>

</xml_diff>

<commit_message>
Hab nochmal was geändert
</commit_message>
<xml_diff>
--- a/Documentation/Projektpräsentationabschluss.pptx
+++ b/Documentation/Projektpräsentationabschluss.pptx
@@ -5,7 +5,7 @@
     <p:sldMasterId id="2147483677" r:id="rId1"/>
   </p:sldMasterIdLst>
   <p:notesMasterIdLst>
-    <p:notesMasterId r:id="rId16"/>
+    <p:notesMasterId r:id="rId15"/>
   </p:notesMasterIdLst>
   <p:sldIdLst>
     <p:sldId id="256" r:id="rId2"/>
@@ -13,15 +13,14 @@
     <p:sldId id="262" r:id="rId4"/>
     <p:sldId id="272" r:id="rId5"/>
     <p:sldId id="258" r:id="rId6"/>
-    <p:sldId id="259" r:id="rId7"/>
+    <p:sldId id="274" r:id="rId7"/>
     <p:sldId id="264" r:id="rId8"/>
     <p:sldId id="271" r:id="rId9"/>
     <p:sldId id="266" r:id="rId10"/>
-    <p:sldId id="260" r:id="rId11"/>
-    <p:sldId id="261" r:id="rId12"/>
-    <p:sldId id="267" r:id="rId13"/>
-    <p:sldId id="268" r:id="rId14"/>
-    <p:sldId id="269" r:id="rId15"/>
+    <p:sldId id="261" r:id="rId11"/>
+    <p:sldId id="268" r:id="rId12"/>
+    <p:sldId id="273" r:id="rId13"/>
+    <p:sldId id="269" r:id="rId14"/>
   </p:sldIdLst>
   <p:sldSz cx="12192000" cy="6858000"/>
   <p:notesSz cx="6858000" cy="9144000"/>
@@ -122,7 +121,7 @@
   </p:defaultTextStyle>
   <p:extLst>
     <p:ext uri="{EFAFB233-063F-42B5-8137-9DF3F51BA10A}">
-      <p15:sldGuideLst xmlns:p15="http://schemas.microsoft.com/office/powerpoint/2012/main"/>
+      <p15:sldGuideLst xmlns:p15="http://schemas.microsoft.com/office/powerpoint/2012/main" xmlns=""/>
     </p:ext>
   </p:extLst>
 </p:presentation>
@@ -369,7 +368,7 @@
           <a:p>
             <a:fld id="{3707EE4E-8712-4F08-AF1D-74F42BF5D300}" type="slidenum">
               <a:rPr lang="de-DE" smtClean="0"/>
-              <a:t>‹#›</a:t>
+              <a:t>‹Nr.›</a:t>
             </a:fld>
             <a:endParaRPr lang="de-DE"/>
           </a:p>
@@ -1111,7 +1110,7 @@
           <a:p>
             <a:fld id="{5E680A4B-04F8-4611-9407-6DB017F4B4FB}" type="slidenum">
               <a:rPr lang="de-DE" smtClean="0"/>
-              <a:t>‹#›</a:t>
+              <a:t>‹Nr.›</a:t>
             </a:fld>
             <a:endParaRPr lang="de-DE"/>
           </a:p>
@@ -1402,7 +1401,7 @@
           <a:p>
             <a:fld id="{5E680A4B-04F8-4611-9407-6DB017F4B4FB}" type="slidenum">
               <a:rPr lang="de-DE" smtClean="0"/>
-              <a:t>‹#›</a:t>
+              <a:t>‹Nr.›</a:t>
             </a:fld>
             <a:endParaRPr lang="de-DE"/>
           </a:p>
@@ -1650,7 +1649,7 @@
           <a:p>
             <a:fld id="{5E680A4B-04F8-4611-9407-6DB017F4B4FB}" type="slidenum">
               <a:rPr lang="de-DE" smtClean="0"/>
-              <a:t>‹#›</a:t>
+              <a:t>‹Nr.›</a:t>
             </a:fld>
             <a:endParaRPr lang="de-DE"/>
           </a:p>
@@ -2190,7 +2189,7 @@
           <a:p>
             <a:fld id="{5E680A4B-04F8-4611-9407-6DB017F4B4FB}" type="slidenum">
               <a:rPr lang="de-DE" smtClean="0"/>
-              <a:t>‹#›</a:t>
+              <a:t>‹Nr.›</a:t>
             </a:fld>
             <a:endParaRPr lang="de-DE"/>
           </a:p>
@@ -2438,7 +2437,7 @@
           <a:p>
             <a:fld id="{5E680A4B-04F8-4611-9407-6DB017F4B4FB}" type="slidenum">
               <a:rPr lang="de-DE" smtClean="0"/>
-              <a:t>‹#›</a:t>
+              <a:t>‹Nr.›</a:t>
             </a:fld>
             <a:endParaRPr lang="de-DE"/>
           </a:p>
@@ -2970,7 +2969,7 @@
           <a:p>
             <a:fld id="{5E680A4B-04F8-4611-9407-6DB017F4B4FB}" type="slidenum">
               <a:rPr lang="de-DE" smtClean="0"/>
-              <a:t>‹#›</a:t>
+              <a:t>‹Nr.›</a:t>
             </a:fld>
             <a:endParaRPr lang="de-DE"/>
           </a:p>
@@ -3267,7 +3266,7 @@
           <a:p>
             <a:fld id="{5E680A4B-04F8-4611-9407-6DB017F4B4FB}" type="slidenum">
               <a:rPr lang="de-DE" smtClean="0"/>
-              <a:t>‹#›</a:t>
+              <a:t>‹Nr.›</a:t>
             </a:fld>
             <a:endParaRPr lang="de-DE"/>
           </a:p>
@@ -3441,7 +3440,7 @@
           <a:p>
             <a:fld id="{5E680A4B-04F8-4611-9407-6DB017F4B4FB}" type="slidenum">
               <a:rPr lang="de-DE" smtClean="0"/>
-              <a:t>‹#›</a:t>
+              <a:t>‹Nr.›</a:t>
             </a:fld>
             <a:endParaRPr lang="de-DE"/>
           </a:p>
@@ -3621,7 +3620,7 @@
           <a:p>
             <a:fld id="{5E680A4B-04F8-4611-9407-6DB017F4B4FB}" type="slidenum">
               <a:rPr lang="de-DE" smtClean="0"/>
-              <a:t>‹#›</a:t>
+              <a:t>‹Nr.›</a:t>
             </a:fld>
             <a:endParaRPr lang="de-DE"/>
           </a:p>
@@ -3796,7 +3795,7 @@
           <a:p>
             <a:fld id="{5E680A4B-04F8-4611-9407-6DB017F4B4FB}" type="slidenum">
               <a:rPr lang="de-DE" smtClean="0"/>
-              <a:t>‹#›</a:t>
+              <a:t>‹Nr.›</a:t>
             </a:fld>
             <a:endParaRPr lang="de-DE"/>
           </a:p>
@@ -4042,7 +4041,7 @@
           <a:p>
             <a:fld id="{5E680A4B-04F8-4611-9407-6DB017F4B4FB}" type="slidenum">
               <a:rPr lang="de-DE" smtClean="0"/>
-              <a:t>‹#›</a:t>
+              <a:t>‹Nr.›</a:t>
             </a:fld>
             <a:endParaRPr lang="de-DE"/>
           </a:p>
@@ -4339,7 +4338,7 @@
           <a:p>
             <a:fld id="{5E680A4B-04F8-4611-9407-6DB017F4B4FB}" type="slidenum">
               <a:rPr lang="de-DE" smtClean="0"/>
-              <a:t>‹#›</a:t>
+              <a:t>‹Nr.›</a:t>
             </a:fld>
             <a:endParaRPr lang="de-DE"/>
           </a:p>
@@ -4781,7 +4780,7 @@
           <a:p>
             <a:fld id="{5E680A4B-04F8-4611-9407-6DB017F4B4FB}" type="slidenum">
               <a:rPr lang="de-DE" smtClean="0"/>
-              <a:t>‹#›</a:t>
+              <a:t>‹Nr.›</a:t>
             </a:fld>
             <a:endParaRPr lang="de-DE"/>
           </a:p>
@@ -4899,7 +4898,7 @@
           <a:p>
             <a:fld id="{5E680A4B-04F8-4611-9407-6DB017F4B4FB}" type="slidenum">
               <a:rPr lang="de-DE" smtClean="0"/>
-              <a:t>‹#›</a:t>
+              <a:t>‹Nr.›</a:t>
             </a:fld>
             <a:endParaRPr lang="de-DE"/>
           </a:p>
@@ -4994,7 +4993,7 @@
           <a:p>
             <a:fld id="{5E680A4B-04F8-4611-9407-6DB017F4B4FB}" type="slidenum">
               <a:rPr lang="de-DE" smtClean="0"/>
-              <a:t>‹#›</a:t>
+              <a:t>‹Nr.›</a:t>
             </a:fld>
             <a:endParaRPr lang="de-DE"/>
           </a:p>
@@ -5277,7 +5276,7 @@
           <a:p>
             <a:fld id="{5E680A4B-04F8-4611-9407-6DB017F4B4FB}" type="slidenum">
               <a:rPr lang="de-DE" smtClean="0"/>
-              <a:t>‹#›</a:t>
+              <a:t>‹Nr.›</a:t>
             </a:fld>
             <a:endParaRPr lang="de-DE"/>
           </a:p>
@@ -5568,7 +5567,7 @@
           <a:p>
             <a:fld id="{5E680A4B-04F8-4611-9407-6DB017F4B4FB}" type="slidenum">
               <a:rPr lang="de-DE" smtClean="0"/>
-              <a:t>‹#›</a:t>
+              <a:t>‹Nr.›</a:t>
             </a:fld>
             <a:endParaRPr lang="de-DE"/>
           </a:p>
@@ -6134,7 +6133,7 @@
           <a:p>
             <a:fld id="{5E680A4B-04F8-4611-9407-6DB017F4B4FB}" type="slidenum">
               <a:rPr lang="de-DE" smtClean="0"/>
-              <a:t>‹#›</a:t>
+              <a:t>‹Nr.›</a:t>
             </a:fld>
             <a:endParaRPr lang="de-DE"/>
           </a:p>
@@ -6664,6 +6663,13 @@
   <p:clrMapOvr>
     <a:masterClrMapping/>
   </p:clrMapOvr>
+  <p:timing>
+    <p:tnLst>
+      <p:par>
+        <p:cTn id="1" dur="indefinite" restart="never" nodeType="tmRoot"/>
+      </p:par>
+    </p:tnLst>
+  </p:timing>
 </p:sld>
 </file>
 
@@ -6700,61 +6706,52 @@
           <a:lstStyle/>
           <a:p>
             <a:r>
+              <a:rPr lang="de-DE" b="1" dirty="0" smtClean="0"/>
+              <a:t>Spark</a:t>
+            </a:r>
+            <a:endParaRPr lang="de-DE" b="1" dirty="0"/>
+          </a:p>
+        </p:txBody>
+      </p:sp>
+      <p:sp>
+        <p:nvSpPr>
+          <p:cNvPr id="3" name="Inhaltsplatzhalter 2"/>
+          <p:cNvSpPr>
+            <a:spLocks noGrp="1"/>
+          </p:cNvSpPr>
+          <p:nvPr>
+            <p:ph idx="1"/>
+          </p:nvPr>
+        </p:nvSpPr>
+        <p:spPr/>
+        <p:txBody>
+          <a:bodyPr/>
+          <a:lstStyle/>
+          <a:p>
+            <a:r>
               <a:rPr lang="de-DE" dirty="0" smtClean="0"/>
-              <a:t>Docker</a:t>
-            </a:r>
+              <a:t>Analyse der übergebenen Daten</a:t>
+            </a:r>
+            <a:endParaRPr lang="de-DE" dirty="0" smtClean="0"/>
+          </a:p>
+          <a:p>
+            <a:endParaRPr lang="de-DE" dirty="0" smtClean="0"/>
+          </a:p>
+          <a:p>
+            <a:r>
+              <a:rPr lang="de-DE" dirty="0" smtClean="0"/>
+              <a:t>Verwendung von Java anstelle von Scala</a:t>
+            </a:r>
+          </a:p>
+          <a:p>
             <a:endParaRPr lang="de-DE" dirty="0"/>
           </a:p>
-        </p:txBody>
-      </p:sp>
-      <p:sp>
-        <p:nvSpPr>
-          <p:cNvPr id="3" name="Inhaltsplatzhalter 2"/>
-          <p:cNvSpPr>
-            <a:spLocks noGrp="1"/>
-          </p:cNvSpPr>
-          <p:nvPr>
-            <p:ph idx="1"/>
-          </p:nvPr>
-        </p:nvSpPr>
-        <p:spPr/>
-        <p:txBody>
-          <a:bodyPr/>
-          <a:lstStyle/>
           <a:p>
             <a:r>
               <a:rPr lang="de-DE" dirty="0" smtClean="0"/>
-              <a:t>Taktstraße</a:t>
+              <a:t>Verbindung zu Kafka über Spark Streaming</a:t>
             </a:r>
             <a:endParaRPr lang="de-DE" dirty="0" smtClean="0"/>
-          </a:p>
-          <a:p>
-            <a:r>
-              <a:rPr lang="de-DE" dirty="0" smtClean="0"/>
-              <a:t>Kafka</a:t>
-            </a:r>
-          </a:p>
-          <a:p>
-            <a:r>
-              <a:rPr lang="de-DE" dirty="0" smtClean="0"/>
-              <a:t>Spark</a:t>
-            </a:r>
-          </a:p>
-          <a:p>
-            <a:r>
-              <a:rPr lang="de-DE" dirty="0" err="1" smtClean="0"/>
-              <a:t>Postgres</a:t>
-            </a:r>
-            <a:endParaRPr lang="de-DE" dirty="0" smtClean="0"/>
-          </a:p>
-          <a:p>
-            <a:r>
-              <a:rPr lang="de-DE" dirty="0" smtClean="0"/>
-              <a:t>(UI)</a:t>
-            </a:r>
-          </a:p>
-          <a:p>
-            <a:endParaRPr lang="de-DE" dirty="0"/>
           </a:p>
         </p:txBody>
       </p:sp>
@@ -6784,13 +6781,20 @@
     </p:spTree>
     <p:extLst>
       <p:ext uri="{BB962C8B-B14F-4D97-AF65-F5344CB8AC3E}">
-        <p14:creationId xmlns:p14="http://schemas.microsoft.com/office/powerpoint/2010/main" val="1998128531"/>
+        <p14:creationId xmlns:p14="http://schemas.microsoft.com/office/powerpoint/2010/main" val="214549362"/>
       </p:ext>
     </p:extLst>
   </p:cSld>
   <p:clrMapOvr>
     <a:masterClrMapping/>
   </p:clrMapOvr>
+  <p:timing>
+    <p:tnLst>
+      <p:par>
+        <p:cTn id="1" dur="indefinite" restart="never" nodeType="tmRoot"/>
+      </p:par>
+    </p:tnLst>
+  </p:timing>
 </p:sld>
 </file>
 
@@ -6827,33 +6831,59 @@
           <a:lstStyle/>
           <a:p>
             <a:r>
+              <a:rPr lang="de-DE" b="1" dirty="0" smtClean="0"/>
+              <a:t>User Interface</a:t>
+            </a:r>
+            <a:endParaRPr lang="de-DE" b="1" dirty="0"/>
+          </a:p>
+        </p:txBody>
+      </p:sp>
+      <p:sp>
+        <p:nvSpPr>
+          <p:cNvPr id="3" name="Inhaltsplatzhalter 2"/>
+          <p:cNvSpPr>
+            <a:spLocks noGrp="1"/>
+          </p:cNvSpPr>
+          <p:nvPr>
+            <p:ph idx="1"/>
+          </p:nvPr>
+        </p:nvSpPr>
+        <p:spPr/>
+        <p:txBody>
+          <a:bodyPr anchor="t"/>
+          <a:lstStyle/>
+          <a:p>
+            <a:r>
               <a:rPr lang="de-DE" dirty="0" smtClean="0"/>
-              <a:t>Spark</a:t>
+              <a:t>Verwendung von OpenUI5</a:t>
+            </a:r>
+          </a:p>
+          <a:p>
+            <a:endParaRPr lang="de-DE" dirty="0" smtClean="0"/>
+          </a:p>
+          <a:p>
+            <a:r>
+              <a:rPr lang="de-DE" dirty="0" smtClean="0"/>
+              <a:t>Darstellung der </a:t>
+            </a:r>
+            <a:r>
+              <a:rPr lang="de-DE" dirty="0" smtClean="0"/>
+              <a:t>Daten </a:t>
             </a:r>
             <a:endParaRPr lang="de-DE" dirty="0"/>
           </a:p>
-        </p:txBody>
-      </p:sp>
-      <p:sp>
-        <p:nvSpPr>
-          <p:cNvPr id="3" name="Inhaltsplatzhalter 2"/>
-          <p:cNvSpPr>
-            <a:spLocks noGrp="1"/>
-          </p:cNvSpPr>
-          <p:nvPr>
-            <p:ph idx="1"/>
-          </p:nvPr>
-        </p:nvSpPr>
-        <p:spPr/>
-        <p:txBody>
-          <a:bodyPr/>
-          <a:lstStyle/>
+          <a:p>
+            <a:endParaRPr lang="de-DE" dirty="0" smtClean="0"/>
+          </a:p>
           <a:p>
             <a:r>
               <a:rPr lang="de-DE" dirty="0" smtClean="0"/>
-              <a:t>Für die Datenanalyse</a:t>
+              <a:t>Anbindung an das Backend über einen … Webserver</a:t>
             </a:r>
             <a:endParaRPr lang="de-DE" dirty="0"/>
+          </a:p>
+          <a:p>
+            <a:endParaRPr lang="de-DE" dirty="0" smtClean="0"/>
           </a:p>
         </p:txBody>
       </p:sp>
@@ -6883,13 +6913,20 @@
     </p:spTree>
     <p:extLst>
       <p:ext uri="{BB962C8B-B14F-4D97-AF65-F5344CB8AC3E}">
-        <p14:creationId xmlns:p14="http://schemas.microsoft.com/office/powerpoint/2010/main" val="214549362"/>
+        <p14:creationId xmlns:p14="http://schemas.microsoft.com/office/powerpoint/2010/main" val="3770692475"/>
       </p:ext>
     </p:extLst>
   </p:cSld>
   <p:clrMapOvr>
     <a:masterClrMapping/>
   </p:clrMapOvr>
+  <p:timing>
+    <p:tnLst>
+      <p:par>
+        <p:cTn id="1" dur="indefinite" restart="never" nodeType="tmRoot"/>
+      </p:par>
+    </p:tnLst>
+  </p:timing>
 </p:sld>
 </file>
 
@@ -6912,7 +6949,7 @@
       </p:grpSpPr>
       <p:sp>
         <p:nvSpPr>
-          <p:cNvPr id="2" name="Titel 1"/>
+          <p:cNvPr id="5" name="Titel 4"/>
           <p:cNvSpPr>
             <a:spLocks noGrp="1"/>
           </p:cNvSpPr>
@@ -6922,37 +6959,35 @@
         </p:nvSpPr>
         <p:spPr/>
         <p:txBody>
+          <a:bodyPr>
+            <a:normAutofit/>
+          </a:bodyPr>
+          <a:lstStyle/>
+          <a:p>
+            <a:r>
+              <a:rPr lang="de-DE" sz="7200" b="1" dirty="0" smtClean="0"/>
+              <a:t>DEMO</a:t>
+            </a:r>
+            <a:endParaRPr lang="de-DE" sz="7200" b="1" dirty="0"/>
+          </a:p>
+        </p:txBody>
+      </p:sp>
+      <p:sp>
+        <p:nvSpPr>
+          <p:cNvPr id="6" name="Textplatzhalter 5"/>
+          <p:cNvSpPr>
+            <a:spLocks noGrp="1"/>
+          </p:cNvSpPr>
+          <p:nvPr>
+            <p:ph type="body" idx="1"/>
+          </p:nvPr>
+        </p:nvSpPr>
+        <p:spPr/>
+        <p:txBody>
           <a:bodyPr/>
           <a:lstStyle/>
           <a:p>
-            <a:r>
-              <a:rPr lang="de-DE" dirty="0" smtClean="0"/>
-              <a:t>Spark Streaming</a:t>
-            </a:r>
-            <a:endParaRPr lang="de-DE" dirty="0"/>
-          </a:p>
-        </p:txBody>
-      </p:sp>
-      <p:sp>
-        <p:nvSpPr>
-          <p:cNvPr id="3" name="Inhaltsplatzhalter 2"/>
-          <p:cNvSpPr>
-            <a:spLocks noGrp="1"/>
-          </p:cNvSpPr>
-          <p:nvPr>
-            <p:ph idx="1"/>
-          </p:nvPr>
-        </p:nvSpPr>
-        <p:spPr/>
-        <p:txBody>
-          <a:bodyPr/>
-          <a:lstStyle/>
-          <a:p>
-            <a:r>
-              <a:rPr lang="de-DE" dirty="0" smtClean="0"/>
-              <a:t>Verbindung zwischen Kafka und Spark</a:t>
-            </a:r>
-            <a:endParaRPr lang="de-DE" dirty="0"/>
+            <a:endParaRPr lang="de-DE"/>
           </a:p>
         </p:txBody>
       </p:sp>
@@ -6982,13 +7017,20 @@
     </p:spTree>
     <p:extLst>
       <p:ext uri="{BB962C8B-B14F-4D97-AF65-F5344CB8AC3E}">
-        <p14:creationId xmlns:p14="http://schemas.microsoft.com/office/powerpoint/2010/main" val="2213054590"/>
+        <p14:creationId xmlns:p14="http://schemas.microsoft.com/office/powerpoint/2010/main" val="2231457816"/>
       </p:ext>
     </p:extLst>
   </p:cSld>
   <p:clrMapOvr>
     <a:masterClrMapping/>
   </p:clrMapOvr>
+  <p:timing>
+    <p:tnLst>
+      <p:par>
+        <p:cTn id="1" dur="indefinite" restart="never" nodeType="tmRoot"/>
+      </p:par>
+    </p:tnLst>
+  </p:timing>
 </p:sld>
 </file>
 
@@ -7011,119 +7053,6 @@
       </p:grpSpPr>
       <p:sp>
         <p:nvSpPr>
-          <p:cNvPr id="2" name="Titel 1"/>
-          <p:cNvSpPr>
-            <a:spLocks noGrp="1"/>
-          </p:cNvSpPr>
-          <p:nvPr>
-            <p:ph type="title"/>
-          </p:nvPr>
-        </p:nvSpPr>
-        <p:spPr/>
-        <p:txBody>
-          <a:bodyPr/>
-          <a:lstStyle/>
-          <a:p>
-            <a:r>
-              <a:rPr lang="de-DE" dirty="0" smtClean="0"/>
-              <a:t>UI</a:t>
-            </a:r>
-            <a:endParaRPr lang="de-DE" dirty="0"/>
-          </a:p>
-        </p:txBody>
-      </p:sp>
-      <p:sp>
-        <p:nvSpPr>
-          <p:cNvPr id="3" name="Inhaltsplatzhalter 2"/>
-          <p:cNvSpPr>
-            <a:spLocks noGrp="1"/>
-          </p:cNvSpPr>
-          <p:nvPr>
-            <p:ph idx="1"/>
-          </p:nvPr>
-        </p:nvSpPr>
-        <p:spPr/>
-        <p:txBody>
-          <a:bodyPr anchor="t"/>
-          <a:lstStyle/>
-          <a:p>
-            <a:r>
-              <a:rPr lang="de-DE" dirty="0" smtClean="0"/>
-              <a:t>Mit </a:t>
-            </a:r>
-            <a:r>
-              <a:rPr lang="de-DE" dirty="0" err="1" smtClean="0"/>
-              <a:t>OpenUI</a:t>
-            </a:r>
-            <a:r>
-              <a:rPr lang="de-DE" dirty="0" smtClean="0"/>
-              <a:t> 5 erstellt</a:t>
-            </a:r>
-          </a:p>
-          <a:p>
-            <a:r>
-              <a:rPr lang="de-DE" dirty="0" smtClean="0"/>
-              <a:t>Darstellung der Daten</a:t>
-            </a:r>
-            <a:endParaRPr lang="de-DE" dirty="0"/>
-          </a:p>
-        </p:txBody>
-      </p:sp>
-      <p:sp>
-        <p:nvSpPr>
-          <p:cNvPr id="4" name="Foliennummernplatzhalter 3"/>
-          <p:cNvSpPr>
-            <a:spLocks noGrp="1"/>
-          </p:cNvSpPr>
-          <p:nvPr>
-            <p:ph type="sldNum" sz="quarter" idx="12"/>
-          </p:nvPr>
-        </p:nvSpPr>
-        <p:spPr/>
-        <p:txBody>
-          <a:bodyPr/>
-          <a:lstStyle/>
-          <a:p>
-            <a:fld id="{5E680A4B-04F8-4611-9407-6DB017F4B4FB}" type="slidenum">
-              <a:rPr lang="de-DE" smtClean="0"/>
-              <a:t>13</a:t>
-            </a:fld>
-            <a:endParaRPr lang="de-DE"/>
-          </a:p>
-        </p:txBody>
-      </p:sp>
-    </p:spTree>
-    <p:extLst>
-      <p:ext uri="{BB962C8B-B14F-4D97-AF65-F5344CB8AC3E}">
-        <p14:creationId xmlns:p14="http://schemas.microsoft.com/office/powerpoint/2010/main" val="3770692475"/>
-      </p:ext>
-    </p:extLst>
-  </p:cSld>
-  <p:clrMapOvr>
-    <a:masterClrMapping/>
-  </p:clrMapOvr>
-</p:sld>
-</file>
-
-<file path=ppt/slides/slide14.xml><?xml version="1.0" encoding="utf-8"?>
-<p:sld xmlns:a="http://schemas.openxmlformats.org/drawingml/2006/main" xmlns:r="http://schemas.openxmlformats.org/officeDocument/2006/relationships" xmlns:p="http://schemas.openxmlformats.org/presentationml/2006/main">
-  <p:cSld>
-    <p:spTree>
-      <p:nvGrpSpPr>
-        <p:cNvPr id="1" name=""/>
-        <p:cNvGrpSpPr/>
-        <p:nvPr/>
-      </p:nvGrpSpPr>
-      <p:grpSpPr>
-        <a:xfrm>
-          <a:off x="0" y="0"/>
-          <a:ext cx="0" cy="0"/>
-          <a:chOff x="0" y="0"/>
-          <a:chExt cx="0" cy="0"/>
-        </a:xfrm>
-      </p:grpSpPr>
-      <p:sp>
-        <p:nvSpPr>
           <p:cNvPr id="4" name="Titel 3"/>
           <p:cNvSpPr>
             <a:spLocks noGrp="1"/>
@@ -7182,6 +7111,13 @@
   <p:clrMapOvr>
     <a:masterClrMapping/>
   </p:clrMapOvr>
+  <p:timing>
+    <p:tnLst>
+      <p:par>
+        <p:cTn id="1" dur="indefinite" restart="never" nodeType="tmRoot"/>
+      </p:par>
+    </p:tnLst>
+  </p:timing>
 </p:sld>
 </file>
 
@@ -7218,51 +7154,72 @@
           <a:lstStyle/>
           <a:p>
             <a:r>
+              <a:rPr lang="de-DE" b="1" dirty="0" smtClean="0"/>
+              <a:t>Gliederung</a:t>
+            </a:r>
+            <a:endParaRPr lang="de-DE" b="1" dirty="0"/>
+          </a:p>
+        </p:txBody>
+      </p:sp>
+      <p:sp>
+        <p:nvSpPr>
+          <p:cNvPr id="3" name="Inhaltsplatzhalter 2"/>
+          <p:cNvSpPr>
+            <a:spLocks noGrp="1"/>
+          </p:cNvSpPr>
+          <p:nvPr>
+            <p:ph idx="1"/>
+          </p:nvPr>
+        </p:nvSpPr>
+        <p:spPr/>
+        <p:txBody>
+          <a:bodyPr anchor="t"/>
+          <a:lstStyle/>
+          <a:p>
+            <a:pPr marL="457200" indent="-457200">
+              <a:buFont typeface="+mj-lt"/>
+              <a:buAutoNum type="arabicPeriod"/>
+            </a:pPr>
+            <a:r>
               <a:rPr lang="de-DE" dirty="0" smtClean="0"/>
-              <a:t>Gliederung</a:t>
-            </a:r>
-            <a:endParaRPr lang="de-DE" dirty="0"/>
-          </a:p>
-        </p:txBody>
-      </p:sp>
-      <p:sp>
-        <p:nvSpPr>
-          <p:cNvPr id="3" name="Inhaltsplatzhalter 2"/>
-          <p:cNvSpPr>
-            <a:spLocks noGrp="1"/>
-          </p:cNvSpPr>
-          <p:nvPr>
-            <p:ph idx="1"/>
-          </p:nvPr>
-        </p:nvSpPr>
-        <p:spPr/>
-        <p:txBody>
-          <a:bodyPr anchor="t"/>
-          <a:lstStyle/>
-          <a:p>
-            <a:r>
-              <a:rPr lang="de-DE" dirty="0" smtClean="0"/>
-              <a:t>Vorgehensweise</a:t>
-            </a:r>
-          </a:p>
-          <a:p>
+              <a:t>Vorgehensweise </a:t>
+            </a:r>
+            <a:endParaRPr lang="de-DE" dirty="0" smtClean="0"/>
+          </a:p>
+          <a:p>
+            <a:pPr marL="457200" indent="-457200">
+              <a:buFont typeface="+mj-lt"/>
+              <a:buAutoNum type="arabicPeriod"/>
+            </a:pPr>
             <a:r>
               <a:rPr lang="de-DE" dirty="0" err="1" smtClean="0"/>
               <a:t>Git</a:t>
             </a:r>
+            <a:r>
+              <a:rPr lang="de-DE" dirty="0" smtClean="0"/>
+              <a:t> Repository</a:t>
+            </a:r>
             <a:endParaRPr lang="de-DE" dirty="0" smtClean="0"/>
           </a:p>
           <a:p>
+            <a:pPr marL="457200" indent="-457200">
+              <a:buFont typeface="+mj-lt"/>
+              <a:buAutoNum type="arabicPeriod"/>
+            </a:pPr>
             <a:r>
               <a:rPr lang="de-DE" dirty="0" smtClean="0"/>
-              <a:t>Taktstraße</a:t>
+              <a:t>Pipeline</a:t>
             </a:r>
             <a:endParaRPr lang="de-DE" dirty="0" smtClean="0"/>
           </a:p>
           <a:p>
+            <a:pPr marL="457200" indent="-457200">
+              <a:buFont typeface="+mj-lt"/>
+              <a:buAutoNum type="arabicPeriod"/>
+            </a:pPr>
             <a:r>
               <a:rPr lang="de-DE" dirty="0" smtClean="0"/>
-              <a:t>UI</a:t>
+              <a:t>Demo</a:t>
             </a:r>
             <a:endParaRPr lang="de-DE" dirty="0"/>
           </a:p>
@@ -7301,6 +7258,13 @@
   <p:clrMapOvr>
     <a:masterClrMapping/>
   </p:clrMapOvr>
+  <p:timing>
+    <p:tnLst>
+      <p:par>
+        <p:cTn id="1" dur="indefinite" restart="never" nodeType="tmRoot"/>
+      </p:par>
+    </p:tnLst>
+  </p:timing>
 </p:sld>
 </file>
 
@@ -7337,10 +7301,10 @@
           <a:lstStyle/>
           <a:p>
             <a:r>
-              <a:rPr lang="de-DE" dirty="0" smtClean="0"/>
+              <a:rPr lang="de-DE" b="1" dirty="0" smtClean="0"/>
               <a:t>Vorgehensweise</a:t>
             </a:r>
-            <a:endParaRPr lang="de-DE" dirty="0"/>
+            <a:endParaRPr lang="de-DE" b="1" dirty="0"/>
           </a:p>
         </p:txBody>
       </p:sp>
@@ -7363,7 +7327,15 @@
           <a:p>
             <a:r>
               <a:rPr lang="de-DE" dirty="0" smtClean="0"/>
-              <a:t>Daten von Reichwalt bekommen</a:t>
+              <a:t>Daten von </a:t>
+            </a:r>
+            <a:r>
+              <a:rPr lang="de-DE" dirty="0" smtClean="0"/>
+              <a:t>Reichwald </a:t>
+            </a:r>
+            <a:r>
+              <a:rPr lang="de-DE" dirty="0" smtClean="0"/>
+              <a:t>bekommen</a:t>
             </a:r>
           </a:p>
           <a:p>
@@ -7371,7 +7343,6 @@
               <a:rPr lang="de-DE" dirty="0" smtClean="0"/>
               <a:t>Taktstraßensimulation</a:t>
             </a:r>
-            <a:endParaRPr lang="de-DE" dirty="0" smtClean="0"/>
           </a:p>
           <a:p>
             <a:r>
@@ -7454,6 +7425,13 @@
   <p:clrMapOvr>
     <a:masterClrMapping/>
   </p:clrMapOvr>
+  <p:timing>
+    <p:tnLst>
+      <p:par>
+        <p:cTn id="1" dur="indefinite" restart="never" nodeType="tmRoot"/>
+      </p:par>
+    </p:tnLst>
+  </p:timing>
 </p:sld>
 </file>
 
@@ -7490,10 +7468,10 @@
           <a:lstStyle/>
           <a:p>
             <a:r>
-              <a:rPr lang="de-DE" dirty="0" smtClean="0"/>
+              <a:rPr lang="de-DE" b="1" dirty="0" smtClean="0"/>
               <a:t>Vorgehensweise</a:t>
             </a:r>
-            <a:endParaRPr lang="de-DE" dirty="0"/>
+            <a:endParaRPr lang="de-DE" b="1" dirty="0"/>
           </a:p>
         </p:txBody>
       </p:sp>
@@ -7523,14 +7501,24 @@
           <a:p>
             <a:r>
               <a:rPr lang="de-DE" dirty="0" smtClean="0"/>
-              <a:t>Daten von Reichwalt</a:t>
-            </a:r>
-          </a:p>
-          <a:p>
+              <a:t>Daten von </a:t>
+            </a:r>
             <a:r>
               <a:rPr lang="de-DE" dirty="0" smtClean="0"/>
-              <a:t>Kafka Docker von Reichwalt</a:t>
-            </a:r>
+              <a:t>Reichwald</a:t>
+            </a:r>
+            <a:endParaRPr lang="de-DE" dirty="0" smtClean="0"/>
+          </a:p>
+          <a:p>
+            <a:r>
+              <a:rPr lang="de-DE" dirty="0" smtClean="0"/>
+              <a:t>Kafka Docker von </a:t>
+            </a:r>
+            <a:r>
+              <a:rPr lang="de-DE" dirty="0" smtClean="0"/>
+              <a:t>Reichwald</a:t>
+            </a:r>
+            <a:endParaRPr lang="de-DE" dirty="0" smtClean="0"/>
           </a:p>
           <a:p>
             <a:r>
@@ -7545,8 +7533,13 @@
             </a:r>
             <a:r>
               <a:rPr lang="de-DE" dirty="0" smtClean="0"/>
-              <a:t> von Reichwalt</a:t>
-            </a:r>
+              <a:t> von </a:t>
+            </a:r>
+            <a:r>
+              <a:rPr lang="de-DE" dirty="0" smtClean="0"/>
+              <a:t>Reichwald</a:t>
+            </a:r>
+            <a:endParaRPr lang="de-DE" dirty="0" smtClean="0"/>
           </a:p>
           <a:p>
             <a:r>
@@ -7608,6 +7601,13 @@
   <p:clrMapOvr>
     <a:masterClrMapping/>
   </p:clrMapOvr>
+  <p:timing>
+    <p:tnLst>
+      <p:par>
+        <p:cTn id="1" dur="indefinite" restart="never" nodeType="tmRoot"/>
+      </p:par>
+    </p:tnLst>
+  </p:timing>
 </p:sld>
 </file>
 
@@ -7644,10 +7644,14 @@
           <a:lstStyle/>
           <a:p>
             <a:r>
-              <a:rPr lang="de-DE" dirty="0" err="1" smtClean="0"/>
+              <a:rPr lang="de-DE" b="1" dirty="0" err="1" smtClean="0"/>
               <a:t>Git</a:t>
             </a:r>
-            <a:endParaRPr lang="de-DE" dirty="0"/>
+            <a:r>
+              <a:rPr lang="de-DE" b="1" dirty="0" smtClean="0"/>
+              <a:t> Repository</a:t>
+            </a:r>
+            <a:endParaRPr lang="de-DE" b="1" dirty="0"/>
           </a:p>
         </p:txBody>
       </p:sp>
@@ -7661,22 +7665,76 @@
             <p:ph idx="1"/>
           </p:nvPr>
         </p:nvSpPr>
-        <p:spPr/>
-        <p:txBody>
-          <a:bodyPr/>
-          <a:lstStyle/>
-          <a:p>
+        <p:spPr>
+          <a:xfrm>
+            <a:off x="1484310" y="2666999"/>
+            <a:ext cx="10018713" cy="3605012"/>
+          </a:xfrm>
+        </p:spPr>
+        <p:txBody>
+          <a:bodyPr>
+            <a:normAutofit/>
+          </a:bodyPr>
+          <a:lstStyle/>
+          <a:p>
+            <a:r>
+              <a:rPr lang="de-DE" dirty="0" smtClean="0"/>
+              <a:t>Feature </a:t>
+            </a:r>
             <a:r>
               <a:rPr lang="de-DE" dirty="0" err="1" smtClean="0"/>
               <a:t>Branching</a:t>
             </a:r>
+            <a:endParaRPr lang="de-DE" dirty="0" smtClean="0"/>
+          </a:p>
+          <a:p>
+            <a:pPr lvl="1"/>
             <a:r>
               <a:rPr lang="de-DE" dirty="0" smtClean="0"/>
-              <a:t> Model: Feature </a:t>
-            </a:r>
+              <a:t>Master</a:t>
+            </a:r>
+          </a:p>
+          <a:p>
+            <a:pPr lvl="1"/>
             <a:r>
               <a:rPr lang="de-DE" dirty="0" err="1" smtClean="0"/>
-              <a:t>Branching</a:t>
+              <a:t>Documentation</a:t>
+            </a:r>
+            <a:endParaRPr lang="de-DE" dirty="0" smtClean="0"/>
+          </a:p>
+          <a:p>
+            <a:pPr lvl="1"/>
+            <a:r>
+              <a:rPr lang="de-DE" dirty="0" smtClean="0"/>
+              <a:t>Docker</a:t>
+            </a:r>
+          </a:p>
+          <a:p>
+            <a:pPr lvl="1"/>
+            <a:r>
+              <a:rPr lang="de-DE" dirty="0" smtClean="0"/>
+              <a:t>Spark</a:t>
+            </a:r>
+          </a:p>
+          <a:p>
+            <a:pPr lvl="1"/>
+            <a:r>
+              <a:rPr lang="de-DE" dirty="0" smtClean="0"/>
+              <a:t>UI</a:t>
+            </a:r>
+          </a:p>
+          <a:p>
+            <a:pPr lvl="1"/>
+            <a:r>
+              <a:rPr lang="de-DE" dirty="0" smtClean="0"/>
+              <a:t>Pipeline</a:t>
+            </a:r>
+          </a:p>
+          <a:p>
+            <a:pPr lvl="1"/>
+            <a:r>
+              <a:rPr lang="de-DE" dirty="0" smtClean="0"/>
+              <a:t>Database</a:t>
             </a:r>
             <a:endParaRPr lang="de-DE" dirty="0"/>
           </a:p>
@@ -7715,6 +7773,13 @@
   <p:clrMapOvr>
     <a:masterClrMapping/>
   </p:clrMapOvr>
+  <p:timing>
+    <p:tnLst>
+      <p:par>
+        <p:cTn id="1" dur="indefinite" restart="never" nodeType="tmRoot"/>
+      </p:par>
+    </p:tnLst>
+  </p:timing>
 </p:sld>
 </file>
 
@@ -7751,60 +7816,10 @@
           <a:lstStyle/>
           <a:p>
             <a:r>
-              <a:rPr lang="de-DE" dirty="0" smtClean="0"/>
-              <a:t>Taktstraße</a:t>
-            </a:r>
-            <a:endParaRPr lang="de-DE" dirty="0"/>
-          </a:p>
-        </p:txBody>
-      </p:sp>
-      <p:sp>
-        <p:nvSpPr>
-          <p:cNvPr id="3" name="Inhaltsplatzhalter 2"/>
-          <p:cNvSpPr>
-            <a:spLocks noGrp="1"/>
-          </p:cNvSpPr>
-          <p:nvPr>
-            <p:ph idx="1"/>
-          </p:nvPr>
-        </p:nvSpPr>
-        <p:spPr/>
-        <p:txBody>
-          <a:bodyPr/>
-          <a:lstStyle/>
-          <a:p>
-            <a:r>
-              <a:rPr lang="de-DE" dirty="0" err="1" smtClean="0"/>
-              <a:t>Activemq</a:t>
-            </a:r>
-            <a:endParaRPr lang="de-DE" dirty="0" smtClean="0"/>
-          </a:p>
-          <a:p>
-            <a:r>
-              <a:rPr lang="de-DE" dirty="0" smtClean="0"/>
-              <a:t>UI</a:t>
-            </a:r>
-          </a:p>
-          <a:p>
-            <a:r>
-              <a:rPr lang="de-DE" dirty="0" smtClean="0"/>
-              <a:t>Datenbank</a:t>
-            </a:r>
-          </a:p>
-          <a:p>
-            <a:r>
-              <a:rPr lang="de-DE" dirty="0" smtClean="0"/>
-              <a:t>Consumer</a:t>
-            </a:r>
-          </a:p>
-          <a:p>
-            <a:r>
-              <a:rPr lang="de-DE" dirty="0" smtClean="0"/>
-              <a:t>Server</a:t>
-            </a:r>
-          </a:p>
-          <a:p>
-            <a:endParaRPr lang="de-DE" dirty="0"/>
+              <a:rPr lang="de-DE" b="1" dirty="0" smtClean="0"/>
+              <a:t>Pipeline</a:t>
+            </a:r>
+            <a:endParaRPr lang="de-DE" b="1" dirty="0"/>
           </a:p>
         </p:txBody>
       </p:sp>
@@ -7831,16 +7846,697 @@
           </a:p>
         </p:txBody>
       </p:sp>
+      <p:sp>
+        <p:nvSpPr>
+          <p:cNvPr id="5" name="Rechteck 4"/>
+          <p:cNvSpPr/>
+          <p:nvPr/>
+        </p:nvSpPr>
+        <p:spPr>
+          <a:xfrm>
+            <a:off x="1790163" y="2620852"/>
+            <a:ext cx="9414457" cy="3039414"/>
+          </a:xfrm>
+          <a:prstGeom prst="rect">
+            <a:avLst/>
+          </a:prstGeom>
+          <a:solidFill>
+            <a:schemeClr val="accent1">
+              <a:lumMod val="20000"/>
+              <a:lumOff val="80000"/>
+            </a:schemeClr>
+          </a:solidFill>
+        </p:spPr>
+        <p:style>
+          <a:lnRef idx="2">
+            <a:schemeClr val="accent1">
+              <a:shade val="50000"/>
+            </a:schemeClr>
+          </a:lnRef>
+          <a:fillRef idx="1">
+            <a:schemeClr val="accent1"/>
+          </a:fillRef>
+          <a:effectRef idx="0">
+            <a:schemeClr val="accent1"/>
+          </a:effectRef>
+          <a:fontRef idx="minor">
+            <a:schemeClr val="lt1"/>
+          </a:fontRef>
+        </p:style>
+        <p:txBody>
+          <a:bodyPr rtlCol="0" anchor="ctr"/>
+          <a:lstStyle/>
+          <a:p>
+            <a:pPr algn="ctr"/>
+            <a:endParaRPr lang="de-DE" dirty="0"/>
+          </a:p>
+        </p:txBody>
+      </p:sp>
+      <p:sp>
+        <p:nvSpPr>
+          <p:cNvPr id="6" name="Rechteck 5"/>
+          <p:cNvSpPr/>
+          <p:nvPr/>
+        </p:nvSpPr>
+        <p:spPr>
+          <a:xfrm>
+            <a:off x="2215168" y="4082605"/>
+            <a:ext cx="1532586" cy="734096"/>
+          </a:xfrm>
+          <a:prstGeom prst="rect">
+            <a:avLst/>
+          </a:prstGeom>
+        </p:spPr>
+        <p:style>
+          <a:lnRef idx="2">
+            <a:schemeClr val="accent1">
+              <a:shade val="50000"/>
+            </a:schemeClr>
+          </a:lnRef>
+          <a:fillRef idx="1">
+            <a:schemeClr val="accent1"/>
+          </a:fillRef>
+          <a:effectRef idx="0">
+            <a:schemeClr val="accent1"/>
+          </a:effectRef>
+          <a:fontRef idx="minor">
+            <a:schemeClr val="lt1"/>
+          </a:fontRef>
+        </p:style>
+        <p:txBody>
+          <a:bodyPr rtlCol="0" anchor="ctr"/>
+          <a:lstStyle/>
+          <a:p>
+            <a:pPr algn="ctr"/>
+            <a:r>
+              <a:rPr lang="de-DE" dirty="0" smtClean="0"/>
+              <a:t>Taktstraße</a:t>
+            </a:r>
+            <a:endParaRPr lang="de-DE" dirty="0"/>
+          </a:p>
+        </p:txBody>
+      </p:sp>
+      <p:sp>
+        <p:nvSpPr>
+          <p:cNvPr id="7" name="Rechteck 6"/>
+          <p:cNvSpPr/>
+          <p:nvPr/>
+        </p:nvSpPr>
+        <p:spPr>
+          <a:xfrm>
+            <a:off x="4016064" y="3500909"/>
+            <a:ext cx="1532586" cy="734096"/>
+          </a:xfrm>
+          <a:prstGeom prst="rect">
+            <a:avLst/>
+          </a:prstGeom>
+        </p:spPr>
+        <p:style>
+          <a:lnRef idx="2">
+            <a:schemeClr val="accent1">
+              <a:shade val="50000"/>
+            </a:schemeClr>
+          </a:lnRef>
+          <a:fillRef idx="1">
+            <a:schemeClr val="accent1"/>
+          </a:fillRef>
+          <a:effectRef idx="0">
+            <a:schemeClr val="accent1"/>
+          </a:effectRef>
+          <a:fontRef idx="minor">
+            <a:schemeClr val="lt1"/>
+          </a:fontRef>
+        </p:style>
+        <p:txBody>
+          <a:bodyPr rtlCol="0" anchor="ctr"/>
+          <a:lstStyle/>
+          <a:p>
+            <a:pPr algn="ctr"/>
+            <a:r>
+              <a:rPr lang="de-DE" dirty="0" err="1" smtClean="0"/>
+              <a:t>Activemq</a:t>
+            </a:r>
+            <a:endParaRPr lang="de-DE" dirty="0"/>
+          </a:p>
+        </p:txBody>
+      </p:sp>
+      <p:sp>
+        <p:nvSpPr>
+          <p:cNvPr id="8" name="Rechteck 7"/>
+          <p:cNvSpPr/>
+          <p:nvPr/>
+        </p:nvSpPr>
+        <p:spPr>
+          <a:xfrm>
+            <a:off x="4016064" y="4617081"/>
+            <a:ext cx="1532586" cy="734096"/>
+          </a:xfrm>
+          <a:prstGeom prst="rect">
+            <a:avLst/>
+          </a:prstGeom>
+        </p:spPr>
+        <p:style>
+          <a:lnRef idx="2">
+            <a:schemeClr val="accent1">
+              <a:shade val="50000"/>
+            </a:schemeClr>
+          </a:lnRef>
+          <a:fillRef idx="1">
+            <a:schemeClr val="accent1"/>
+          </a:fillRef>
+          <a:effectRef idx="0">
+            <a:schemeClr val="accent1"/>
+          </a:effectRef>
+          <a:fontRef idx="minor">
+            <a:schemeClr val="lt1"/>
+          </a:fontRef>
+        </p:style>
+        <p:txBody>
+          <a:bodyPr rtlCol="0" anchor="ctr"/>
+          <a:lstStyle/>
+          <a:p>
+            <a:pPr algn="ctr"/>
+            <a:r>
+              <a:rPr lang="de-DE" dirty="0" smtClean="0"/>
+              <a:t>Kafka</a:t>
+            </a:r>
+            <a:endParaRPr lang="de-DE" dirty="0"/>
+          </a:p>
+        </p:txBody>
+      </p:sp>
+      <p:sp>
+        <p:nvSpPr>
+          <p:cNvPr id="9" name="Rechteck 8"/>
+          <p:cNvSpPr/>
+          <p:nvPr/>
+        </p:nvSpPr>
+        <p:spPr>
+          <a:xfrm>
+            <a:off x="5838425" y="4082605"/>
+            <a:ext cx="1532586" cy="734096"/>
+          </a:xfrm>
+          <a:prstGeom prst="rect">
+            <a:avLst/>
+          </a:prstGeom>
+        </p:spPr>
+        <p:style>
+          <a:lnRef idx="2">
+            <a:schemeClr val="accent1">
+              <a:shade val="50000"/>
+            </a:schemeClr>
+          </a:lnRef>
+          <a:fillRef idx="1">
+            <a:schemeClr val="accent1"/>
+          </a:fillRef>
+          <a:effectRef idx="0">
+            <a:schemeClr val="accent1"/>
+          </a:effectRef>
+          <a:fontRef idx="minor">
+            <a:schemeClr val="lt1"/>
+          </a:fontRef>
+        </p:style>
+        <p:txBody>
+          <a:bodyPr rtlCol="0" anchor="ctr"/>
+          <a:lstStyle/>
+          <a:p>
+            <a:pPr algn="ctr"/>
+            <a:r>
+              <a:rPr lang="de-DE" dirty="0" smtClean="0"/>
+              <a:t>Spark</a:t>
+            </a:r>
+            <a:endParaRPr lang="de-DE" dirty="0"/>
+          </a:p>
+        </p:txBody>
+      </p:sp>
+      <p:sp>
+        <p:nvSpPr>
+          <p:cNvPr id="10" name="Rechteck 9"/>
+          <p:cNvSpPr/>
+          <p:nvPr/>
+        </p:nvSpPr>
+        <p:spPr>
+          <a:xfrm>
+            <a:off x="7673663" y="2985754"/>
+            <a:ext cx="1532586" cy="734096"/>
+          </a:xfrm>
+          <a:prstGeom prst="rect">
+            <a:avLst/>
+          </a:prstGeom>
+        </p:spPr>
+        <p:style>
+          <a:lnRef idx="2">
+            <a:schemeClr val="accent1">
+              <a:shade val="50000"/>
+            </a:schemeClr>
+          </a:lnRef>
+          <a:fillRef idx="1">
+            <a:schemeClr val="accent1"/>
+          </a:fillRef>
+          <a:effectRef idx="0">
+            <a:schemeClr val="accent1"/>
+          </a:effectRef>
+          <a:fontRef idx="minor">
+            <a:schemeClr val="lt1"/>
+          </a:fontRef>
+        </p:style>
+        <p:txBody>
+          <a:bodyPr rtlCol="0" anchor="ctr"/>
+          <a:lstStyle/>
+          <a:p>
+            <a:pPr algn="ctr"/>
+            <a:r>
+              <a:rPr lang="de-DE" dirty="0" err="1" smtClean="0"/>
+              <a:t>Postgresql</a:t>
+            </a:r>
+            <a:endParaRPr lang="de-DE" dirty="0"/>
+          </a:p>
+        </p:txBody>
+      </p:sp>
+      <p:sp>
+        <p:nvSpPr>
+          <p:cNvPr id="11" name="Rechteck 10"/>
+          <p:cNvSpPr/>
+          <p:nvPr/>
+        </p:nvSpPr>
+        <p:spPr>
+          <a:xfrm>
+            <a:off x="7673663" y="4082605"/>
+            <a:ext cx="1532586" cy="734096"/>
+          </a:xfrm>
+          <a:prstGeom prst="rect">
+            <a:avLst/>
+          </a:prstGeom>
+        </p:spPr>
+        <p:style>
+          <a:lnRef idx="2">
+            <a:schemeClr val="accent1">
+              <a:shade val="50000"/>
+            </a:schemeClr>
+          </a:lnRef>
+          <a:fillRef idx="1">
+            <a:schemeClr val="accent1"/>
+          </a:fillRef>
+          <a:effectRef idx="0">
+            <a:schemeClr val="accent1"/>
+          </a:effectRef>
+          <a:fontRef idx="minor">
+            <a:schemeClr val="lt1"/>
+          </a:fontRef>
+        </p:style>
+        <p:txBody>
+          <a:bodyPr rtlCol="0" anchor="ctr"/>
+          <a:lstStyle/>
+          <a:p>
+            <a:pPr algn="ctr"/>
+            <a:r>
+              <a:rPr lang="de-DE" dirty="0" smtClean="0"/>
+              <a:t>Webserver</a:t>
+            </a:r>
+            <a:endParaRPr lang="de-DE" dirty="0"/>
+          </a:p>
+        </p:txBody>
+      </p:sp>
+      <p:sp>
+        <p:nvSpPr>
+          <p:cNvPr id="12" name="Rechteck 11"/>
+          <p:cNvSpPr/>
+          <p:nvPr/>
+        </p:nvSpPr>
+        <p:spPr>
+          <a:xfrm>
+            <a:off x="9504609" y="4082605"/>
+            <a:ext cx="1532586" cy="734096"/>
+          </a:xfrm>
+          <a:prstGeom prst="rect">
+            <a:avLst/>
+          </a:prstGeom>
+        </p:spPr>
+        <p:style>
+          <a:lnRef idx="2">
+            <a:schemeClr val="accent1">
+              <a:shade val="50000"/>
+            </a:schemeClr>
+          </a:lnRef>
+          <a:fillRef idx="1">
+            <a:schemeClr val="accent1"/>
+          </a:fillRef>
+          <a:effectRef idx="0">
+            <a:schemeClr val="accent1"/>
+          </a:effectRef>
+          <a:fontRef idx="minor">
+            <a:schemeClr val="lt1"/>
+          </a:fontRef>
+        </p:style>
+        <p:txBody>
+          <a:bodyPr rtlCol="0" anchor="ctr"/>
+          <a:lstStyle/>
+          <a:p>
+            <a:pPr algn="ctr"/>
+            <a:r>
+              <a:rPr lang="de-DE" dirty="0" smtClean="0"/>
+              <a:t>UI</a:t>
+            </a:r>
+            <a:endParaRPr lang="de-DE" dirty="0"/>
+          </a:p>
+        </p:txBody>
+      </p:sp>
+      <p:cxnSp>
+        <p:nvCxnSpPr>
+          <p:cNvPr id="13" name="Gerade Verbindung mit Pfeil 12"/>
+          <p:cNvCxnSpPr>
+            <a:stCxn id="6" idx="3"/>
+            <a:endCxn id="7" idx="1"/>
+          </p:cNvCxnSpPr>
+          <p:nvPr/>
+        </p:nvCxnSpPr>
+        <p:spPr>
+          <a:xfrm flipV="1">
+            <a:off x="3747754" y="3867957"/>
+            <a:ext cx="268310" cy="581696"/>
+          </a:xfrm>
+          <a:prstGeom prst="straightConnector1">
+            <a:avLst/>
+          </a:prstGeom>
+          <a:ln>
+            <a:solidFill>
+              <a:schemeClr val="accent1">
+                <a:lumMod val="50000"/>
+              </a:schemeClr>
+            </a:solidFill>
+            <a:tailEnd type="arrow"/>
+          </a:ln>
+        </p:spPr>
+        <p:style>
+          <a:lnRef idx="1">
+            <a:schemeClr val="accent1"/>
+          </a:lnRef>
+          <a:fillRef idx="0">
+            <a:schemeClr val="accent1"/>
+          </a:fillRef>
+          <a:effectRef idx="0">
+            <a:schemeClr val="accent1"/>
+          </a:effectRef>
+          <a:fontRef idx="minor">
+            <a:schemeClr val="tx1"/>
+          </a:fontRef>
+        </p:style>
+      </p:cxnSp>
+      <p:cxnSp>
+        <p:nvCxnSpPr>
+          <p:cNvPr id="14" name="Gerade Verbindung mit Pfeil 13"/>
+          <p:cNvCxnSpPr>
+            <a:stCxn id="6" idx="3"/>
+            <a:endCxn id="8" idx="1"/>
+          </p:cNvCxnSpPr>
+          <p:nvPr/>
+        </p:nvCxnSpPr>
+        <p:spPr>
+          <a:xfrm>
+            <a:off x="3747754" y="4449653"/>
+            <a:ext cx="268310" cy="534476"/>
+          </a:xfrm>
+          <a:prstGeom prst="straightConnector1">
+            <a:avLst/>
+          </a:prstGeom>
+          <a:ln>
+            <a:solidFill>
+              <a:schemeClr val="accent1">
+                <a:lumMod val="50000"/>
+              </a:schemeClr>
+            </a:solidFill>
+            <a:tailEnd type="arrow"/>
+          </a:ln>
+        </p:spPr>
+        <p:style>
+          <a:lnRef idx="1">
+            <a:schemeClr val="accent1"/>
+          </a:lnRef>
+          <a:fillRef idx="0">
+            <a:schemeClr val="accent1"/>
+          </a:fillRef>
+          <a:effectRef idx="0">
+            <a:schemeClr val="accent1"/>
+          </a:effectRef>
+          <a:fontRef idx="minor">
+            <a:schemeClr val="tx1"/>
+          </a:fontRef>
+        </p:style>
+      </p:cxnSp>
+      <p:cxnSp>
+        <p:nvCxnSpPr>
+          <p:cNvPr id="15" name="Gerade Verbindung mit Pfeil 14"/>
+          <p:cNvCxnSpPr>
+            <a:stCxn id="7" idx="3"/>
+            <a:endCxn id="9" idx="1"/>
+          </p:cNvCxnSpPr>
+          <p:nvPr/>
+        </p:nvCxnSpPr>
+        <p:spPr>
+          <a:xfrm>
+            <a:off x="5548650" y="3867957"/>
+            <a:ext cx="289775" cy="581696"/>
+          </a:xfrm>
+          <a:prstGeom prst="straightConnector1">
+            <a:avLst/>
+          </a:prstGeom>
+          <a:ln>
+            <a:solidFill>
+              <a:schemeClr val="accent1">
+                <a:lumMod val="50000"/>
+              </a:schemeClr>
+            </a:solidFill>
+            <a:tailEnd type="arrow"/>
+          </a:ln>
+        </p:spPr>
+        <p:style>
+          <a:lnRef idx="1">
+            <a:schemeClr val="accent1"/>
+          </a:lnRef>
+          <a:fillRef idx="0">
+            <a:schemeClr val="accent1"/>
+          </a:fillRef>
+          <a:effectRef idx="0">
+            <a:schemeClr val="accent1"/>
+          </a:effectRef>
+          <a:fontRef idx="minor">
+            <a:schemeClr val="tx1"/>
+          </a:fontRef>
+        </p:style>
+      </p:cxnSp>
+      <p:cxnSp>
+        <p:nvCxnSpPr>
+          <p:cNvPr id="16" name="Gerade Verbindung mit Pfeil 15"/>
+          <p:cNvCxnSpPr>
+            <a:stCxn id="8" idx="3"/>
+            <a:endCxn id="9" idx="1"/>
+          </p:cNvCxnSpPr>
+          <p:nvPr/>
+        </p:nvCxnSpPr>
+        <p:spPr>
+          <a:xfrm flipV="1">
+            <a:off x="5548650" y="4449653"/>
+            <a:ext cx="289775" cy="534476"/>
+          </a:xfrm>
+          <a:prstGeom prst="straightConnector1">
+            <a:avLst/>
+          </a:prstGeom>
+          <a:ln>
+            <a:solidFill>
+              <a:schemeClr val="accent1">
+                <a:lumMod val="50000"/>
+              </a:schemeClr>
+            </a:solidFill>
+            <a:tailEnd type="arrow"/>
+          </a:ln>
+        </p:spPr>
+        <p:style>
+          <a:lnRef idx="1">
+            <a:schemeClr val="accent1"/>
+          </a:lnRef>
+          <a:fillRef idx="0">
+            <a:schemeClr val="accent1"/>
+          </a:fillRef>
+          <a:effectRef idx="0">
+            <a:schemeClr val="accent1"/>
+          </a:effectRef>
+          <a:fontRef idx="minor">
+            <a:schemeClr val="tx1"/>
+          </a:fontRef>
+        </p:style>
+      </p:cxnSp>
+      <p:cxnSp>
+        <p:nvCxnSpPr>
+          <p:cNvPr id="17" name="Gerade Verbindung mit Pfeil 16"/>
+          <p:cNvCxnSpPr>
+            <a:endCxn id="10" idx="1"/>
+          </p:cNvCxnSpPr>
+          <p:nvPr/>
+        </p:nvCxnSpPr>
+        <p:spPr>
+          <a:xfrm flipV="1">
+            <a:off x="7371011" y="3352802"/>
+            <a:ext cx="302652" cy="1096851"/>
+          </a:xfrm>
+          <a:prstGeom prst="straightConnector1">
+            <a:avLst/>
+          </a:prstGeom>
+          <a:ln>
+            <a:solidFill>
+              <a:schemeClr val="accent1">
+                <a:lumMod val="50000"/>
+              </a:schemeClr>
+            </a:solidFill>
+            <a:tailEnd type="arrow"/>
+          </a:ln>
+        </p:spPr>
+        <p:style>
+          <a:lnRef idx="1">
+            <a:schemeClr val="accent1"/>
+          </a:lnRef>
+          <a:fillRef idx="0">
+            <a:schemeClr val="accent1"/>
+          </a:fillRef>
+          <a:effectRef idx="0">
+            <a:schemeClr val="accent1"/>
+          </a:effectRef>
+          <a:fontRef idx="minor">
+            <a:schemeClr val="tx1"/>
+          </a:fontRef>
+        </p:style>
+      </p:cxnSp>
+      <p:cxnSp>
+        <p:nvCxnSpPr>
+          <p:cNvPr id="18" name="Gerade Verbindung mit Pfeil 17"/>
+          <p:cNvCxnSpPr>
+            <a:stCxn id="9" idx="3"/>
+            <a:endCxn id="11" idx="1"/>
+          </p:cNvCxnSpPr>
+          <p:nvPr/>
+        </p:nvCxnSpPr>
+        <p:spPr>
+          <a:xfrm>
+            <a:off x="7371011" y="4449653"/>
+            <a:ext cx="302652" cy="0"/>
+          </a:xfrm>
+          <a:prstGeom prst="straightConnector1">
+            <a:avLst/>
+          </a:prstGeom>
+          <a:ln>
+            <a:solidFill>
+              <a:schemeClr val="accent1">
+                <a:lumMod val="50000"/>
+              </a:schemeClr>
+            </a:solidFill>
+            <a:tailEnd type="arrow"/>
+          </a:ln>
+        </p:spPr>
+        <p:style>
+          <a:lnRef idx="1">
+            <a:schemeClr val="accent1"/>
+          </a:lnRef>
+          <a:fillRef idx="0">
+            <a:schemeClr val="accent1"/>
+          </a:fillRef>
+          <a:effectRef idx="0">
+            <a:schemeClr val="accent1"/>
+          </a:effectRef>
+          <a:fontRef idx="minor">
+            <a:schemeClr val="tx1"/>
+          </a:fontRef>
+        </p:style>
+      </p:cxnSp>
+      <p:cxnSp>
+        <p:nvCxnSpPr>
+          <p:cNvPr id="19" name="Gerade Verbindung mit Pfeil 18"/>
+          <p:cNvCxnSpPr>
+            <a:stCxn id="11" idx="3"/>
+            <a:endCxn id="12" idx="1"/>
+          </p:cNvCxnSpPr>
+          <p:nvPr/>
+        </p:nvCxnSpPr>
+        <p:spPr>
+          <a:xfrm>
+            <a:off x="9206249" y="4449653"/>
+            <a:ext cx="298360" cy="0"/>
+          </a:xfrm>
+          <a:prstGeom prst="straightConnector1">
+            <a:avLst/>
+          </a:prstGeom>
+          <a:ln>
+            <a:solidFill>
+              <a:schemeClr val="accent1">
+                <a:lumMod val="50000"/>
+              </a:schemeClr>
+            </a:solidFill>
+            <a:tailEnd type="arrow"/>
+          </a:ln>
+        </p:spPr>
+        <p:style>
+          <a:lnRef idx="1">
+            <a:schemeClr val="accent1"/>
+          </a:lnRef>
+          <a:fillRef idx="0">
+            <a:schemeClr val="accent1"/>
+          </a:fillRef>
+          <a:effectRef idx="0">
+            <a:schemeClr val="accent1"/>
+          </a:effectRef>
+          <a:fontRef idx="minor">
+            <a:schemeClr val="tx1"/>
+          </a:fontRef>
+        </p:style>
+      </p:cxnSp>
+      <p:sp>
+        <p:nvSpPr>
+          <p:cNvPr id="20" name="Textfeld 19"/>
+          <p:cNvSpPr txBox="1"/>
+          <p:nvPr/>
+        </p:nvSpPr>
+        <p:spPr>
+          <a:xfrm>
+            <a:off x="1790163" y="2620852"/>
+            <a:ext cx="1988715" cy="369332"/>
+          </a:xfrm>
+          <a:prstGeom prst="rect">
+            <a:avLst/>
+          </a:prstGeom>
+          <a:noFill/>
+        </p:spPr>
+        <p:txBody>
+          <a:bodyPr wrap="square" rtlCol="0">
+            <a:spAutoFit/>
+          </a:bodyPr>
+          <a:lstStyle/>
+          <a:p>
+            <a:r>
+              <a:rPr lang="de-DE" dirty="0" smtClean="0"/>
+              <a:t>Docker-</a:t>
+            </a:r>
+            <a:r>
+              <a:rPr lang="de-DE" dirty="0" err="1" smtClean="0"/>
+              <a:t>compose</a:t>
+            </a:r>
+            <a:endParaRPr lang="de-DE" dirty="0"/>
+          </a:p>
+        </p:txBody>
+      </p:sp>
     </p:spTree>
     <p:extLst>
       <p:ext uri="{BB962C8B-B14F-4D97-AF65-F5344CB8AC3E}">
-        <p14:creationId xmlns:p14="http://schemas.microsoft.com/office/powerpoint/2010/main" val="1348452335"/>
+        <p14:creationId xmlns:p14="http://schemas.microsoft.com/office/powerpoint/2010/main" val="2838556579"/>
       </p:ext>
     </p:extLst>
   </p:cSld>
   <p:clrMapOvr>
     <a:masterClrMapping/>
   </p:clrMapOvr>
+  <p:timing>
+    <p:tnLst>
+      <p:par>
+        <p:cTn id="1" dur="indefinite" restart="never" nodeType="tmRoot"/>
+      </p:par>
+    </p:tnLst>
+  </p:timing>
 </p:sld>
 </file>
 
@@ -7877,35 +8573,48 @@
           <a:lstStyle/>
           <a:p>
             <a:r>
+              <a:rPr lang="de-DE" b="1" dirty="0" smtClean="0"/>
+              <a:t>Taktstraße</a:t>
+            </a:r>
+            <a:endParaRPr lang="de-DE" b="1" dirty="0"/>
+          </a:p>
+        </p:txBody>
+      </p:sp>
+      <p:sp>
+        <p:nvSpPr>
+          <p:cNvPr id="3" name="Inhaltsplatzhalter 2"/>
+          <p:cNvSpPr>
+            <a:spLocks noGrp="1"/>
+          </p:cNvSpPr>
+          <p:nvPr>
+            <p:ph idx="1"/>
+          </p:nvPr>
+        </p:nvSpPr>
+        <p:spPr/>
+        <p:txBody>
+          <a:bodyPr/>
+          <a:lstStyle/>
+          <a:p>
+            <a:r>
               <a:rPr lang="de-DE" dirty="0" smtClean="0"/>
-              <a:t>Taktstraßensimulation</a:t>
-            </a:r>
+              <a:t>Liefert Daten zu der Produktion</a:t>
+            </a:r>
+          </a:p>
+          <a:p>
             <a:endParaRPr lang="de-DE" dirty="0"/>
           </a:p>
-        </p:txBody>
-      </p:sp>
-      <p:sp>
-        <p:nvSpPr>
-          <p:cNvPr id="3" name="Inhaltsplatzhalter 2"/>
-          <p:cNvSpPr>
-            <a:spLocks noGrp="1"/>
-          </p:cNvSpPr>
-          <p:nvPr>
-            <p:ph idx="1"/>
-          </p:nvPr>
-        </p:nvSpPr>
-        <p:spPr/>
-        <p:txBody>
-          <a:bodyPr/>
-          <a:lstStyle/>
           <a:p>
             <a:r>
               <a:rPr lang="de-DE" dirty="0" smtClean="0"/>
-              <a:t>Simulation für die </a:t>
+              <a:t>Benötigt Apache Kafka und </a:t>
+            </a:r>
+            <a:r>
+              <a:rPr lang="de-DE" dirty="0" err="1" smtClean="0"/>
+              <a:t>Activemq</a:t>
             </a:r>
             <a:r>
               <a:rPr lang="de-DE" dirty="0" smtClean="0"/>
-              <a:t>Taktstraße</a:t>
+              <a:t> </a:t>
             </a:r>
             <a:endParaRPr lang="de-DE" dirty="0"/>
           </a:p>
@@ -7944,6 +8653,13 @@
   <p:clrMapOvr>
     <a:masterClrMapping/>
   </p:clrMapOvr>
+  <p:timing>
+    <p:tnLst>
+      <p:par>
+        <p:cTn id="1" dur="indefinite" restart="never" nodeType="tmRoot"/>
+      </p:par>
+    </p:tnLst>
+  </p:timing>
 </p:sld>
 </file>
 
@@ -7980,10 +8696,10 @@
           <a:lstStyle/>
           <a:p>
             <a:r>
-              <a:rPr lang="de-DE" dirty="0" smtClean="0"/>
+              <a:rPr lang="de-DE" b="1" dirty="0" smtClean="0"/>
               <a:t>Kafka</a:t>
             </a:r>
-            <a:endParaRPr lang="de-DE" dirty="0"/>
+            <a:endParaRPr lang="de-DE" b="1" dirty="0"/>
           </a:p>
         </p:txBody>
       </p:sp>
@@ -8083,6 +8799,13 @@
   <p:clrMapOvr>
     <a:masterClrMapping/>
   </p:clrMapOvr>
+  <p:timing>
+    <p:tnLst>
+      <p:par>
+        <p:cTn id="1" dur="indefinite" restart="never" nodeType="tmRoot"/>
+      </p:par>
+    </p:tnLst>
+  </p:timing>
 </p:sld>
 </file>
 
@@ -8119,52 +8842,48 @@
           <a:lstStyle/>
           <a:p>
             <a:r>
+              <a:rPr lang="de-DE" b="1" dirty="0" smtClean="0"/>
+              <a:t>Datenbank</a:t>
+            </a:r>
+            <a:endParaRPr lang="de-DE" b="1" dirty="0"/>
+          </a:p>
+        </p:txBody>
+      </p:sp>
+      <p:sp>
+        <p:nvSpPr>
+          <p:cNvPr id="3" name="Inhaltsplatzhalter 2"/>
+          <p:cNvSpPr>
+            <a:spLocks noGrp="1"/>
+          </p:cNvSpPr>
+          <p:nvPr>
+            <p:ph idx="1"/>
+          </p:nvPr>
+        </p:nvSpPr>
+        <p:spPr/>
+        <p:txBody>
+          <a:bodyPr/>
+          <a:lstStyle/>
+          <a:p>
+            <a:r>
               <a:rPr lang="de-DE" dirty="0" smtClean="0"/>
-              <a:t>Datenbank</a:t>
-            </a:r>
+              <a:t>Verwendung von </a:t>
+            </a:r>
+            <a:r>
+              <a:rPr lang="de-DE" dirty="0" err="1" smtClean="0"/>
+              <a:t>Postgresql</a:t>
+            </a:r>
+            <a:endParaRPr lang="de-DE" dirty="0" smtClean="0"/>
+          </a:p>
+          <a:p>
             <a:endParaRPr lang="de-DE" dirty="0"/>
           </a:p>
-        </p:txBody>
-      </p:sp>
-      <p:sp>
-        <p:nvSpPr>
-          <p:cNvPr id="3" name="Inhaltsplatzhalter 2"/>
-          <p:cNvSpPr>
-            <a:spLocks noGrp="1"/>
-          </p:cNvSpPr>
-          <p:nvPr>
-            <p:ph idx="1"/>
-          </p:nvPr>
-        </p:nvSpPr>
-        <p:spPr/>
-        <p:txBody>
-          <a:bodyPr/>
-          <a:lstStyle/>
           <a:p>
             <a:r>
               <a:rPr lang="de-DE" dirty="0" smtClean="0"/>
-              <a:t>Mit </a:t>
-            </a:r>
-            <a:r>
-              <a:rPr lang="de-DE" dirty="0" err="1" smtClean="0"/>
-              <a:t>Postgres</a:t>
-            </a:r>
-            <a:r>
-              <a:rPr lang="de-DE" dirty="0" smtClean="0"/>
-              <a:t> erstellt</a:t>
-            </a:r>
-          </a:p>
-          <a:p>
-            <a:r>
-              <a:rPr lang="de-DE" dirty="0" smtClean="0"/>
-              <a:t>Relationale Datenbank</a:t>
-            </a:r>
-          </a:p>
-          <a:p>
-            <a:r>
-              <a:rPr lang="de-DE" dirty="0" smtClean="0"/>
-              <a:t>Probleme mit MYSQL</a:t>
-            </a:r>
+              <a:t>Verwenden von 2 Datenbanktabellen</a:t>
+            </a:r>
+          </a:p>
+          <a:p>
             <a:endParaRPr lang="de-DE" dirty="0"/>
           </a:p>
         </p:txBody>
@@ -8202,6 +8921,13 @@
   <p:clrMapOvr>
     <a:masterClrMapping/>
   </p:clrMapOvr>
+  <p:timing>
+    <p:tnLst>
+      <p:par>
+        <p:cTn id="1" dur="indefinite" restart="never" nodeType="tmRoot"/>
+      </p:par>
+    </p:tnLst>
+  </p:timing>
 </p:sld>
 </file>
 
@@ -8455,7 +9181,7 @@
   <a:extraClrSchemeLst/>
   <a:extLst>
     <a:ext uri="{05A4C25C-085E-4340-85A3-A5531E510DB2}">
-      <thm15:themeFamily xmlns:thm15="http://schemas.microsoft.com/office/thememl/2012/main" name="Parallax" id="{3388167B-A2EB-4685-9635-1831D9AEF8C4}" vid="{4F7A876A-7598-49CA-AFC8-8EDA2551E4A7}"/>
+      <thm15:themeFamily xmlns:thm15="http://schemas.microsoft.com/office/thememl/2012/main" xmlns="" name="Parallax" id="{3388167B-A2EB-4685-9635-1831D9AEF8C4}" vid="{4F7A876A-7598-49CA-AFC8-8EDA2551E4A7}"/>
     </a:ext>
   </a:extLst>
 </a:theme>
@@ -8716,7 +9442,7 @@
   <a:extraClrSchemeLst/>
   <a:extLst>
     <a:ext uri="{05A4C25C-085E-4340-85A3-A5531E510DB2}">
-      <thm15:themeFamily xmlns:thm15="http://schemas.microsoft.com/office/thememl/2012/main" name="Office Theme" id="{62F939B6-93AF-4DB8-9C6B-D6C7DFDC589F}" vid="{4A3C46E8-61CC-4603-A589-7422A47A8E4A}"/>
+      <thm15:themeFamily xmlns:thm15="http://schemas.microsoft.com/office/thememl/2012/main" xmlns="" name="Office Theme" id="{62F939B6-93AF-4DB8-9C6B-D6C7DFDC589F}" vid="{4A3C46E8-61CC-4603-A589-7422A47A8E4A}"/>
     </a:ext>
   </a:extLst>
 </a:theme>

</xml_diff>